<commit_message>
called 1000 records, edited pie chart, added chart to PP, readme edits
</commit_message>
<xml_diff>
--- a/FDA – Food Recall.pptx
+++ b/FDA – Food Recall.pptx
@@ -1113,3007 +1113,6 @@
 </cs:chartStyle>
 </file>
 
-<file path=ppt/diagrams/colors1.xml><?xml version="1.0" encoding="utf-8"?>
-<dgm:colorsDef xmlns:dgm="http://schemas.openxmlformats.org/drawingml/2006/diagram" xmlns:a="http://schemas.openxmlformats.org/drawingml/2006/main" uniqueId="urn:microsoft.com/office/officeart/2005/8/colors/accent4_1">
-  <dgm:title val=""/>
-  <dgm:desc val=""/>
-  <dgm:catLst>
-    <dgm:cat type="accent4" pri="11100"/>
-  </dgm:catLst>
-  <dgm:styleLbl name="node0">
-    <dgm:fillClrLst meth="repeat">
-      <a:schemeClr val="lt1"/>
-    </dgm:fillClrLst>
-    <dgm:linClrLst meth="repeat">
-      <a:schemeClr val="accent4">
-        <a:shade val="80000"/>
-      </a:schemeClr>
-    </dgm:linClrLst>
-    <dgm:effectClrLst/>
-    <dgm:txLinClrLst/>
-    <dgm:txFillClrLst meth="repeat">
-      <a:schemeClr val="dk1"/>
-    </dgm:txFillClrLst>
-    <dgm:txEffectClrLst/>
-  </dgm:styleLbl>
-  <dgm:styleLbl name="node1">
-    <dgm:fillClrLst meth="repeat">
-      <a:schemeClr val="lt1"/>
-    </dgm:fillClrLst>
-    <dgm:linClrLst meth="repeat">
-      <a:schemeClr val="accent4">
-        <a:shade val="80000"/>
-      </a:schemeClr>
-    </dgm:linClrLst>
-    <dgm:effectClrLst/>
-    <dgm:txLinClrLst/>
-    <dgm:txFillClrLst meth="repeat">
-      <a:schemeClr val="dk1"/>
-    </dgm:txFillClrLst>
-    <dgm:txEffectClrLst/>
-  </dgm:styleLbl>
-  <dgm:styleLbl name="alignNode1">
-    <dgm:fillClrLst meth="repeat">
-      <a:schemeClr val="lt1"/>
-    </dgm:fillClrLst>
-    <dgm:linClrLst meth="repeat">
-      <a:schemeClr val="accent4">
-        <a:shade val="80000"/>
-      </a:schemeClr>
-    </dgm:linClrLst>
-    <dgm:effectClrLst/>
-    <dgm:txLinClrLst/>
-    <dgm:txFillClrLst meth="repeat">
-      <a:schemeClr val="dk1"/>
-    </dgm:txFillClrLst>
-    <dgm:txEffectClrLst/>
-  </dgm:styleLbl>
-  <dgm:styleLbl name="lnNode1">
-    <dgm:fillClrLst meth="repeat">
-      <a:schemeClr val="lt1"/>
-    </dgm:fillClrLst>
-    <dgm:linClrLst meth="repeat">
-      <a:schemeClr val="accent4">
-        <a:shade val="80000"/>
-      </a:schemeClr>
-    </dgm:linClrLst>
-    <dgm:effectClrLst/>
-    <dgm:txLinClrLst/>
-    <dgm:txFillClrLst meth="repeat">
-      <a:schemeClr val="dk1"/>
-    </dgm:txFillClrLst>
-    <dgm:txEffectClrLst/>
-  </dgm:styleLbl>
-  <dgm:styleLbl name="vennNode1">
-    <dgm:fillClrLst meth="repeat">
-      <a:schemeClr val="lt1">
-        <a:alpha val="50000"/>
-      </a:schemeClr>
-    </dgm:fillClrLst>
-    <dgm:linClrLst meth="repeat">
-      <a:schemeClr val="accent4">
-        <a:shade val="80000"/>
-      </a:schemeClr>
-    </dgm:linClrLst>
-    <dgm:effectClrLst/>
-    <dgm:txLinClrLst/>
-    <dgm:txFillClrLst/>
-    <dgm:txEffectClrLst/>
-  </dgm:styleLbl>
-  <dgm:styleLbl name="node2">
-    <dgm:fillClrLst meth="repeat">
-      <a:schemeClr val="lt1"/>
-    </dgm:fillClrLst>
-    <dgm:linClrLst meth="repeat">
-      <a:schemeClr val="accent4">
-        <a:shade val="80000"/>
-      </a:schemeClr>
-    </dgm:linClrLst>
-    <dgm:effectClrLst/>
-    <dgm:txLinClrLst/>
-    <dgm:txFillClrLst meth="repeat">
-      <a:schemeClr val="dk1"/>
-    </dgm:txFillClrLst>
-    <dgm:txEffectClrLst/>
-  </dgm:styleLbl>
-  <dgm:styleLbl name="node3">
-    <dgm:fillClrLst meth="repeat">
-      <a:schemeClr val="lt1"/>
-    </dgm:fillClrLst>
-    <dgm:linClrLst meth="repeat">
-      <a:schemeClr val="accent4">
-        <a:shade val="80000"/>
-      </a:schemeClr>
-    </dgm:linClrLst>
-    <dgm:effectClrLst/>
-    <dgm:txLinClrLst/>
-    <dgm:txFillClrLst meth="repeat">
-      <a:schemeClr val="dk1"/>
-    </dgm:txFillClrLst>
-    <dgm:txEffectClrLst/>
-  </dgm:styleLbl>
-  <dgm:styleLbl name="node4">
-    <dgm:fillClrLst meth="repeat">
-      <a:schemeClr val="lt1"/>
-    </dgm:fillClrLst>
-    <dgm:linClrLst meth="repeat">
-      <a:schemeClr val="accent4">
-        <a:shade val="80000"/>
-      </a:schemeClr>
-    </dgm:linClrLst>
-    <dgm:effectClrLst/>
-    <dgm:txLinClrLst/>
-    <dgm:txFillClrLst meth="repeat">
-      <a:schemeClr val="dk1"/>
-    </dgm:txFillClrLst>
-    <dgm:txEffectClrLst/>
-  </dgm:styleLbl>
-  <dgm:styleLbl name="fgImgPlace1">
-    <dgm:fillClrLst meth="repeat">
-      <a:schemeClr val="accent4">
-        <a:tint val="40000"/>
-      </a:schemeClr>
-    </dgm:fillClrLst>
-    <dgm:linClrLst meth="repeat">
-      <a:schemeClr val="accent4">
-        <a:shade val="80000"/>
-      </a:schemeClr>
-    </dgm:linClrLst>
-    <dgm:effectClrLst/>
-    <dgm:txLinClrLst/>
-    <dgm:txFillClrLst meth="repeat">
-      <a:schemeClr val="lt1"/>
-    </dgm:txFillClrLst>
-    <dgm:txEffectClrLst/>
-  </dgm:styleLbl>
-  <dgm:styleLbl name="alignImgPlace1">
-    <dgm:fillClrLst meth="repeat">
-      <a:schemeClr val="accent4">
-        <a:tint val="40000"/>
-      </a:schemeClr>
-    </dgm:fillClrLst>
-    <dgm:linClrLst meth="repeat">
-      <a:schemeClr val="accent4">
-        <a:shade val="80000"/>
-      </a:schemeClr>
-    </dgm:linClrLst>
-    <dgm:effectClrLst/>
-    <dgm:txLinClrLst/>
-    <dgm:txFillClrLst meth="repeat">
-      <a:schemeClr val="lt1"/>
-    </dgm:txFillClrLst>
-    <dgm:txEffectClrLst/>
-  </dgm:styleLbl>
-  <dgm:styleLbl name="bgImgPlace1">
-    <dgm:fillClrLst meth="repeat">
-      <a:schemeClr val="accent4">
-        <a:tint val="40000"/>
-      </a:schemeClr>
-    </dgm:fillClrLst>
-    <dgm:linClrLst meth="repeat">
-      <a:schemeClr val="accent4">
-        <a:shade val="80000"/>
-      </a:schemeClr>
-    </dgm:linClrLst>
-    <dgm:effectClrLst/>
-    <dgm:txLinClrLst/>
-    <dgm:txFillClrLst meth="repeat">
-      <a:schemeClr val="lt1"/>
-    </dgm:txFillClrLst>
-    <dgm:txEffectClrLst/>
-  </dgm:styleLbl>
-  <dgm:styleLbl name="sibTrans2D1">
-    <dgm:fillClrLst meth="repeat">
-      <a:schemeClr val="accent4">
-        <a:tint val="60000"/>
-      </a:schemeClr>
-    </dgm:fillClrLst>
-    <dgm:linClrLst meth="repeat">
-      <a:schemeClr val="accent4">
-        <a:tint val="60000"/>
-      </a:schemeClr>
-    </dgm:linClrLst>
-    <dgm:effectClrLst/>
-    <dgm:txLinClrLst/>
-    <dgm:txFillClrLst meth="repeat">
-      <a:schemeClr val="dk1"/>
-    </dgm:txFillClrLst>
-    <dgm:txEffectClrLst/>
-  </dgm:styleLbl>
-  <dgm:styleLbl name="fgSibTrans2D1">
-    <dgm:fillClrLst meth="repeat">
-      <a:schemeClr val="accent4">
-        <a:tint val="60000"/>
-      </a:schemeClr>
-    </dgm:fillClrLst>
-    <dgm:linClrLst meth="repeat">
-      <a:schemeClr val="accent4">
-        <a:tint val="60000"/>
-      </a:schemeClr>
-    </dgm:linClrLst>
-    <dgm:effectClrLst/>
-    <dgm:txLinClrLst/>
-    <dgm:txFillClrLst meth="repeat">
-      <a:schemeClr val="dk1"/>
-    </dgm:txFillClrLst>
-    <dgm:txEffectClrLst/>
-  </dgm:styleLbl>
-  <dgm:styleLbl name="bgSibTrans2D1">
-    <dgm:fillClrLst meth="repeat">
-      <a:schemeClr val="accent4">
-        <a:tint val="60000"/>
-      </a:schemeClr>
-    </dgm:fillClrLst>
-    <dgm:linClrLst meth="repeat">
-      <a:schemeClr val="accent4">
-        <a:tint val="60000"/>
-      </a:schemeClr>
-    </dgm:linClrLst>
-    <dgm:effectClrLst/>
-    <dgm:txLinClrLst/>
-    <dgm:txFillClrLst meth="repeat">
-      <a:schemeClr val="dk1"/>
-    </dgm:txFillClrLst>
-    <dgm:txEffectClrLst/>
-  </dgm:styleLbl>
-  <dgm:styleLbl name="sibTrans1D1">
-    <dgm:fillClrLst meth="repeat">
-      <a:schemeClr val="accent4"/>
-    </dgm:fillClrLst>
-    <dgm:linClrLst meth="repeat">
-      <a:schemeClr val="accent4"/>
-    </dgm:linClrLst>
-    <dgm:effectClrLst/>
-    <dgm:txLinClrLst/>
-    <dgm:txFillClrLst meth="repeat">
-      <a:schemeClr val="tx1"/>
-    </dgm:txFillClrLst>
-    <dgm:txEffectClrLst/>
-  </dgm:styleLbl>
-  <dgm:styleLbl name="callout">
-    <dgm:fillClrLst meth="repeat">
-      <a:schemeClr val="accent4"/>
-    </dgm:fillClrLst>
-    <dgm:linClrLst meth="repeat">
-      <a:schemeClr val="accent4"/>
-    </dgm:linClrLst>
-    <dgm:effectClrLst/>
-    <dgm:txLinClrLst/>
-    <dgm:txFillClrLst meth="repeat">
-      <a:schemeClr val="tx1"/>
-    </dgm:txFillClrLst>
-    <dgm:txEffectClrLst/>
-  </dgm:styleLbl>
-  <dgm:styleLbl name="asst0">
-    <dgm:fillClrLst meth="repeat">
-      <a:schemeClr val="lt1"/>
-    </dgm:fillClrLst>
-    <dgm:linClrLst meth="repeat">
-      <a:schemeClr val="accent4">
-        <a:shade val="80000"/>
-      </a:schemeClr>
-    </dgm:linClrLst>
-    <dgm:effectClrLst/>
-    <dgm:txLinClrLst/>
-    <dgm:txFillClrLst meth="repeat">
-      <a:schemeClr val="dk1"/>
-    </dgm:txFillClrLst>
-    <dgm:txEffectClrLst/>
-  </dgm:styleLbl>
-  <dgm:styleLbl name="asst1">
-    <dgm:fillClrLst meth="repeat">
-      <a:schemeClr val="lt1"/>
-    </dgm:fillClrLst>
-    <dgm:linClrLst meth="repeat">
-      <a:schemeClr val="accent4">
-        <a:shade val="80000"/>
-      </a:schemeClr>
-    </dgm:linClrLst>
-    <dgm:effectClrLst/>
-    <dgm:txLinClrLst/>
-    <dgm:txFillClrLst meth="repeat">
-      <a:schemeClr val="dk1"/>
-    </dgm:txFillClrLst>
-    <dgm:txEffectClrLst/>
-  </dgm:styleLbl>
-  <dgm:styleLbl name="asst2">
-    <dgm:fillClrLst meth="repeat">
-      <a:schemeClr val="lt1"/>
-    </dgm:fillClrLst>
-    <dgm:linClrLst meth="repeat">
-      <a:schemeClr val="accent4">
-        <a:shade val="80000"/>
-      </a:schemeClr>
-    </dgm:linClrLst>
-    <dgm:effectClrLst/>
-    <dgm:txLinClrLst/>
-    <dgm:txFillClrLst meth="repeat">
-      <a:schemeClr val="dk1"/>
-    </dgm:txFillClrLst>
-    <dgm:txEffectClrLst/>
-  </dgm:styleLbl>
-  <dgm:styleLbl name="asst3">
-    <dgm:fillClrLst meth="repeat">
-      <a:schemeClr val="lt1"/>
-    </dgm:fillClrLst>
-    <dgm:linClrLst meth="repeat">
-      <a:schemeClr val="accent4">
-        <a:shade val="80000"/>
-      </a:schemeClr>
-    </dgm:linClrLst>
-    <dgm:effectClrLst/>
-    <dgm:txLinClrLst/>
-    <dgm:txFillClrLst meth="repeat">
-      <a:schemeClr val="dk1"/>
-    </dgm:txFillClrLst>
-    <dgm:txEffectClrLst/>
-  </dgm:styleLbl>
-  <dgm:styleLbl name="asst4">
-    <dgm:fillClrLst meth="repeat">
-      <a:schemeClr val="lt1"/>
-    </dgm:fillClrLst>
-    <dgm:linClrLst meth="repeat">
-      <a:schemeClr val="accent4">
-        <a:shade val="80000"/>
-      </a:schemeClr>
-    </dgm:linClrLst>
-    <dgm:effectClrLst/>
-    <dgm:txLinClrLst/>
-    <dgm:txFillClrLst meth="repeat">
-      <a:schemeClr val="dk1"/>
-    </dgm:txFillClrLst>
-    <dgm:txEffectClrLst/>
-  </dgm:styleLbl>
-  <dgm:styleLbl name="parChTrans2D1">
-    <dgm:fillClrLst meth="repeat">
-      <a:schemeClr val="accent4">
-        <a:tint val="60000"/>
-      </a:schemeClr>
-    </dgm:fillClrLst>
-    <dgm:linClrLst meth="repeat">
-      <a:schemeClr val="accent4">
-        <a:tint val="60000"/>
-      </a:schemeClr>
-    </dgm:linClrLst>
-    <dgm:effectClrLst/>
-    <dgm:txLinClrLst/>
-    <dgm:txFillClrLst/>
-    <dgm:txEffectClrLst/>
-  </dgm:styleLbl>
-  <dgm:styleLbl name="parChTrans2D2">
-    <dgm:fillClrLst meth="repeat">
-      <a:schemeClr val="accent4"/>
-    </dgm:fillClrLst>
-    <dgm:linClrLst meth="repeat">
-      <a:schemeClr val="accent4"/>
-    </dgm:linClrLst>
-    <dgm:effectClrLst/>
-    <dgm:txLinClrLst/>
-    <dgm:txFillClrLst/>
-    <dgm:txEffectClrLst/>
-  </dgm:styleLbl>
-  <dgm:styleLbl name="parChTrans2D3">
-    <dgm:fillClrLst meth="repeat">
-      <a:schemeClr val="accent4"/>
-    </dgm:fillClrLst>
-    <dgm:linClrLst meth="repeat">
-      <a:schemeClr val="accent4"/>
-    </dgm:linClrLst>
-    <dgm:effectClrLst/>
-    <dgm:txLinClrLst/>
-    <dgm:txFillClrLst/>
-    <dgm:txEffectClrLst/>
-  </dgm:styleLbl>
-  <dgm:styleLbl name="parChTrans2D4">
-    <dgm:fillClrLst meth="repeat">
-      <a:schemeClr val="accent4"/>
-    </dgm:fillClrLst>
-    <dgm:linClrLst meth="repeat">
-      <a:schemeClr val="accent4"/>
-    </dgm:linClrLst>
-    <dgm:effectClrLst/>
-    <dgm:txLinClrLst/>
-    <dgm:txFillClrLst meth="repeat">
-      <a:schemeClr val="lt1"/>
-    </dgm:txFillClrLst>
-    <dgm:txEffectClrLst/>
-  </dgm:styleLbl>
-  <dgm:styleLbl name="parChTrans1D1">
-    <dgm:fillClrLst meth="repeat">
-      <a:schemeClr val="accent4"/>
-    </dgm:fillClrLst>
-    <dgm:linClrLst meth="repeat">
-      <a:schemeClr val="accent4">
-        <a:shade val="60000"/>
-      </a:schemeClr>
-    </dgm:linClrLst>
-    <dgm:effectClrLst/>
-    <dgm:txLinClrLst/>
-    <dgm:txFillClrLst meth="repeat">
-      <a:schemeClr val="tx1"/>
-    </dgm:txFillClrLst>
-    <dgm:txEffectClrLst/>
-  </dgm:styleLbl>
-  <dgm:styleLbl name="parChTrans1D2">
-    <dgm:fillClrLst meth="repeat">
-      <a:schemeClr val="accent4"/>
-    </dgm:fillClrLst>
-    <dgm:linClrLst meth="repeat">
-      <a:schemeClr val="accent4">
-        <a:shade val="60000"/>
-      </a:schemeClr>
-    </dgm:linClrLst>
-    <dgm:effectClrLst/>
-    <dgm:txLinClrLst/>
-    <dgm:txFillClrLst meth="repeat">
-      <a:schemeClr val="tx1"/>
-    </dgm:txFillClrLst>
-    <dgm:txEffectClrLst/>
-  </dgm:styleLbl>
-  <dgm:styleLbl name="parChTrans1D3">
-    <dgm:fillClrLst meth="repeat">
-      <a:schemeClr val="accent4"/>
-    </dgm:fillClrLst>
-    <dgm:linClrLst meth="repeat">
-      <a:schemeClr val="accent4">
-        <a:shade val="80000"/>
-      </a:schemeClr>
-    </dgm:linClrLst>
-    <dgm:effectClrLst/>
-    <dgm:txLinClrLst/>
-    <dgm:txFillClrLst meth="repeat">
-      <a:schemeClr val="tx1"/>
-    </dgm:txFillClrLst>
-    <dgm:txEffectClrLst/>
-  </dgm:styleLbl>
-  <dgm:styleLbl name="parChTrans1D4">
-    <dgm:fillClrLst meth="repeat">
-      <a:schemeClr val="accent4"/>
-    </dgm:fillClrLst>
-    <dgm:linClrLst meth="repeat">
-      <a:schemeClr val="accent4">
-        <a:shade val="80000"/>
-      </a:schemeClr>
-    </dgm:linClrLst>
-    <dgm:effectClrLst/>
-    <dgm:txLinClrLst/>
-    <dgm:txFillClrLst meth="repeat">
-      <a:schemeClr val="tx1"/>
-    </dgm:txFillClrLst>
-    <dgm:txEffectClrLst/>
-  </dgm:styleLbl>
-  <dgm:styleLbl name="fgAcc1">
-    <dgm:fillClrLst meth="repeat">
-      <a:schemeClr val="accent4">
-        <a:alpha val="90000"/>
-        <a:tint val="40000"/>
-      </a:schemeClr>
-    </dgm:fillClrLst>
-    <dgm:linClrLst meth="repeat">
-      <a:schemeClr val="accent4"/>
-    </dgm:linClrLst>
-    <dgm:effectClrLst/>
-    <dgm:txLinClrLst/>
-    <dgm:txFillClrLst meth="repeat">
-      <a:schemeClr val="dk1"/>
-    </dgm:txFillClrLst>
-    <dgm:txEffectClrLst/>
-  </dgm:styleLbl>
-  <dgm:styleLbl name="conFgAcc1">
-    <dgm:fillClrLst meth="repeat">
-      <a:schemeClr val="accent4">
-        <a:alpha val="90000"/>
-        <a:tint val="40000"/>
-      </a:schemeClr>
-    </dgm:fillClrLst>
-    <dgm:linClrLst meth="repeat">
-      <a:schemeClr val="accent4"/>
-    </dgm:linClrLst>
-    <dgm:effectClrLst/>
-    <dgm:txLinClrLst/>
-    <dgm:txFillClrLst meth="repeat">
-      <a:schemeClr val="dk1"/>
-    </dgm:txFillClrLst>
-    <dgm:txEffectClrLst/>
-  </dgm:styleLbl>
-  <dgm:styleLbl name="alignAcc1">
-    <dgm:fillClrLst meth="repeat">
-      <a:schemeClr val="accent4">
-        <a:alpha val="90000"/>
-        <a:tint val="40000"/>
-      </a:schemeClr>
-    </dgm:fillClrLst>
-    <dgm:linClrLst meth="repeat">
-      <a:schemeClr val="accent4"/>
-    </dgm:linClrLst>
-    <dgm:effectClrLst/>
-    <dgm:txLinClrLst/>
-    <dgm:txFillClrLst meth="repeat">
-      <a:schemeClr val="dk1"/>
-    </dgm:txFillClrLst>
-    <dgm:txEffectClrLst/>
-  </dgm:styleLbl>
-  <dgm:styleLbl name="trAlignAcc1">
-    <dgm:fillClrLst meth="repeat">
-      <a:schemeClr val="accent4">
-        <a:alpha val="40000"/>
-        <a:tint val="40000"/>
-      </a:schemeClr>
-    </dgm:fillClrLst>
-    <dgm:linClrLst meth="repeat">
-      <a:schemeClr val="accent4"/>
-    </dgm:linClrLst>
-    <dgm:effectClrLst/>
-    <dgm:txLinClrLst/>
-    <dgm:txFillClrLst meth="repeat">
-      <a:schemeClr val="dk1"/>
-    </dgm:txFillClrLst>
-    <dgm:txEffectClrLst/>
-  </dgm:styleLbl>
-  <dgm:styleLbl name="bgAcc1">
-    <dgm:fillClrLst meth="repeat">
-      <a:schemeClr val="accent4">
-        <a:alpha val="90000"/>
-        <a:tint val="40000"/>
-      </a:schemeClr>
-    </dgm:fillClrLst>
-    <dgm:linClrLst meth="repeat">
-      <a:schemeClr val="accent4"/>
-    </dgm:linClrLst>
-    <dgm:effectClrLst/>
-    <dgm:txLinClrLst/>
-    <dgm:txFillClrLst meth="repeat">
-      <a:schemeClr val="dk1"/>
-    </dgm:txFillClrLst>
-    <dgm:txEffectClrLst/>
-  </dgm:styleLbl>
-  <dgm:styleLbl name="solidFgAcc1">
-    <dgm:fillClrLst meth="repeat">
-      <a:schemeClr val="lt1"/>
-    </dgm:fillClrLst>
-    <dgm:linClrLst meth="repeat">
-      <a:schemeClr val="accent4"/>
-    </dgm:linClrLst>
-    <dgm:effectClrLst/>
-    <dgm:txLinClrLst/>
-    <dgm:txFillClrLst meth="repeat">
-      <a:schemeClr val="dk1"/>
-    </dgm:txFillClrLst>
-    <dgm:txEffectClrLst/>
-  </dgm:styleLbl>
-  <dgm:styleLbl name="solidAlignAcc1">
-    <dgm:fillClrLst meth="repeat">
-      <a:schemeClr val="lt1"/>
-    </dgm:fillClrLst>
-    <dgm:linClrLst meth="repeat">
-      <a:schemeClr val="accent4"/>
-    </dgm:linClrLst>
-    <dgm:effectClrLst/>
-    <dgm:txLinClrLst/>
-    <dgm:txFillClrLst meth="repeat">
-      <a:schemeClr val="dk1"/>
-    </dgm:txFillClrLst>
-    <dgm:txEffectClrLst/>
-  </dgm:styleLbl>
-  <dgm:styleLbl name="solidBgAcc1">
-    <dgm:fillClrLst meth="repeat">
-      <a:schemeClr val="lt1"/>
-    </dgm:fillClrLst>
-    <dgm:linClrLst meth="repeat">
-      <a:schemeClr val="accent4"/>
-    </dgm:linClrLst>
-    <dgm:effectClrLst/>
-    <dgm:txLinClrLst/>
-    <dgm:txFillClrLst meth="repeat">
-      <a:schemeClr val="dk1"/>
-    </dgm:txFillClrLst>
-    <dgm:txEffectClrLst/>
-  </dgm:styleLbl>
-  <dgm:styleLbl name="fgAccFollowNode1">
-    <dgm:fillClrLst meth="repeat">
-      <a:schemeClr val="lt1">
-        <a:alpha val="90000"/>
-        <a:tint val="40000"/>
-      </a:schemeClr>
-    </dgm:fillClrLst>
-    <dgm:linClrLst meth="repeat">
-      <a:schemeClr val="accent4">
-        <a:alpha val="90000"/>
-      </a:schemeClr>
-    </dgm:linClrLst>
-    <dgm:effectClrLst/>
-    <dgm:txLinClrLst/>
-    <dgm:txFillClrLst meth="repeat">
-      <a:schemeClr val="dk1"/>
-    </dgm:txFillClrLst>
-    <dgm:txEffectClrLst/>
-  </dgm:styleLbl>
-  <dgm:styleLbl name="alignAccFollowNode1">
-    <dgm:fillClrLst meth="repeat">
-      <a:schemeClr val="lt1">
-        <a:alpha val="90000"/>
-        <a:tint val="40000"/>
-      </a:schemeClr>
-    </dgm:fillClrLst>
-    <dgm:linClrLst meth="repeat">
-      <a:schemeClr val="accent4">
-        <a:alpha val="90000"/>
-      </a:schemeClr>
-    </dgm:linClrLst>
-    <dgm:effectClrLst/>
-    <dgm:txLinClrLst/>
-    <dgm:txFillClrLst meth="repeat">
-      <a:schemeClr val="dk1"/>
-    </dgm:txFillClrLst>
-    <dgm:txEffectClrLst/>
-  </dgm:styleLbl>
-  <dgm:styleLbl name="bgAccFollowNode1">
-    <dgm:fillClrLst meth="repeat">
-      <a:schemeClr val="lt1">
-        <a:alpha val="90000"/>
-        <a:tint val="40000"/>
-      </a:schemeClr>
-    </dgm:fillClrLst>
-    <dgm:linClrLst meth="repeat">
-      <a:schemeClr val="accent4">
-        <a:alpha val="90000"/>
-      </a:schemeClr>
-    </dgm:linClrLst>
-    <dgm:effectClrLst/>
-    <dgm:txLinClrLst/>
-    <dgm:txFillClrLst meth="repeat">
-      <a:schemeClr val="dk1"/>
-    </dgm:txFillClrLst>
-    <dgm:txEffectClrLst/>
-  </dgm:styleLbl>
-  <dgm:styleLbl name="fgAcc0">
-    <dgm:fillClrLst meth="repeat">
-      <a:schemeClr val="accent4">
-        <a:alpha val="90000"/>
-        <a:tint val="40000"/>
-      </a:schemeClr>
-    </dgm:fillClrLst>
-    <dgm:linClrLst meth="repeat">
-      <a:schemeClr val="accent4"/>
-    </dgm:linClrLst>
-    <dgm:effectClrLst/>
-    <dgm:txLinClrLst/>
-    <dgm:txFillClrLst meth="repeat">
-      <a:schemeClr val="dk1"/>
-    </dgm:txFillClrLst>
-    <dgm:txEffectClrLst/>
-  </dgm:styleLbl>
-  <dgm:styleLbl name="fgAcc2">
-    <dgm:fillClrLst meth="repeat">
-      <a:schemeClr val="accent4">
-        <a:alpha val="90000"/>
-        <a:tint val="40000"/>
-      </a:schemeClr>
-    </dgm:fillClrLst>
-    <dgm:linClrLst meth="repeat">
-      <a:schemeClr val="accent4"/>
-    </dgm:linClrLst>
-    <dgm:effectClrLst/>
-    <dgm:txLinClrLst/>
-    <dgm:txFillClrLst meth="repeat">
-      <a:schemeClr val="dk1"/>
-    </dgm:txFillClrLst>
-    <dgm:txEffectClrLst/>
-  </dgm:styleLbl>
-  <dgm:styleLbl name="fgAcc3">
-    <dgm:fillClrLst meth="repeat">
-      <a:schemeClr val="accent4">
-        <a:alpha val="90000"/>
-        <a:tint val="40000"/>
-      </a:schemeClr>
-    </dgm:fillClrLst>
-    <dgm:linClrLst meth="repeat">
-      <a:schemeClr val="accent4"/>
-    </dgm:linClrLst>
-    <dgm:effectClrLst/>
-    <dgm:txLinClrLst/>
-    <dgm:txFillClrLst meth="repeat">
-      <a:schemeClr val="dk1"/>
-    </dgm:txFillClrLst>
-    <dgm:txEffectClrLst/>
-  </dgm:styleLbl>
-  <dgm:styleLbl name="fgAcc4">
-    <dgm:fillClrLst meth="repeat">
-      <a:schemeClr val="accent4">
-        <a:alpha val="90000"/>
-        <a:tint val="40000"/>
-      </a:schemeClr>
-    </dgm:fillClrLst>
-    <dgm:linClrLst meth="repeat">
-      <a:schemeClr val="accent4"/>
-    </dgm:linClrLst>
-    <dgm:effectClrLst/>
-    <dgm:txLinClrLst/>
-    <dgm:txFillClrLst meth="repeat">
-      <a:schemeClr val="dk1"/>
-    </dgm:txFillClrLst>
-    <dgm:txEffectClrLst/>
-  </dgm:styleLbl>
-  <dgm:styleLbl name="bgShp">
-    <dgm:fillClrLst meth="repeat">
-      <a:schemeClr val="accent4">
-        <a:tint val="40000"/>
-      </a:schemeClr>
-    </dgm:fillClrLst>
-    <dgm:linClrLst meth="repeat">
-      <a:schemeClr val="accent4"/>
-    </dgm:linClrLst>
-    <dgm:effectClrLst/>
-    <dgm:txLinClrLst/>
-    <dgm:txFillClrLst meth="repeat">
-      <a:schemeClr val="dk1"/>
-    </dgm:txFillClrLst>
-    <dgm:txEffectClrLst/>
-  </dgm:styleLbl>
-  <dgm:styleLbl name="dkBgShp">
-    <dgm:fillClrLst meth="repeat">
-      <a:schemeClr val="accent4">
-        <a:shade val="80000"/>
-      </a:schemeClr>
-    </dgm:fillClrLst>
-    <dgm:linClrLst meth="repeat">
-      <a:schemeClr val="accent4"/>
-    </dgm:linClrLst>
-    <dgm:effectClrLst/>
-    <dgm:txLinClrLst/>
-    <dgm:txFillClrLst meth="repeat">
-      <a:schemeClr val="lt1"/>
-    </dgm:txFillClrLst>
-    <dgm:txEffectClrLst/>
-  </dgm:styleLbl>
-  <dgm:styleLbl name="trBgShp">
-    <dgm:fillClrLst meth="repeat">
-      <a:schemeClr val="accent4">
-        <a:tint val="50000"/>
-        <a:alpha val="40000"/>
-      </a:schemeClr>
-    </dgm:fillClrLst>
-    <dgm:linClrLst meth="repeat">
-      <a:schemeClr val="accent4"/>
-    </dgm:linClrLst>
-    <dgm:effectClrLst/>
-    <dgm:txLinClrLst/>
-    <dgm:txFillClrLst meth="repeat">
-      <a:schemeClr val="lt1"/>
-    </dgm:txFillClrLst>
-    <dgm:txEffectClrLst/>
-  </dgm:styleLbl>
-  <dgm:styleLbl name="fgShp">
-    <dgm:fillClrLst meth="repeat">
-      <a:schemeClr val="accent4">
-        <a:tint val="60000"/>
-      </a:schemeClr>
-    </dgm:fillClrLst>
-    <dgm:linClrLst meth="repeat">
-      <a:schemeClr val="lt1"/>
-    </dgm:linClrLst>
-    <dgm:effectClrLst/>
-    <dgm:txLinClrLst/>
-    <dgm:txFillClrLst meth="repeat">
-      <a:schemeClr val="dk1"/>
-    </dgm:txFillClrLst>
-    <dgm:txEffectClrLst/>
-  </dgm:styleLbl>
-  <dgm:styleLbl name="revTx">
-    <dgm:fillClrLst meth="repeat">
-      <a:schemeClr val="lt1">
-        <a:alpha val="0"/>
-      </a:schemeClr>
-    </dgm:fillClrLst>
-    <dgm:linClrLst meth="repeat">
-      <a:schemeClr val="dk1">
-        <a:alpha val="0"/>
-      </a:schemeClr>
-    </dgm:linClrLst>
-    <dgm:effectClrLst/>
-    <dgm:txLinClrLst/>
-    <dgm:txFillClrLst meth="repeat">
-      <a:schemeClr val="tx1"/>
-    </dgm:txFillClrLst>
-    <dgm:txEffectClrLst/>
-  </dgm:styleLbl>
-</dgm:colorsDef>
-</file>
-
-<file path=ppt/diagrams/data1.xml><?xml version="1.0" encoding="utf-8"?>
-<dgm:dataModel xmlns:dgm="http://schemas.openxmlformats.org/drawingml/2006/diagram" xmlns:a="http://schemas.openxmlformats.org/drawingml/2006/main">
-  <dgm:ptLst>
-    <dgm:pt modelId="{D44E9E87-B9B9-4324-8110-FB781FB2AAAE}" type="doc">
-      <dgm:prSet loTypeId="urn:microsoft.com/office/officeart/2005/8/layout/radial6" loCatId="cycle" qsTypeId="urn:microsoft.com/office/officeart/2005/8/quickstyle/simple1" qsCatId="simple" csTypeId="urn:microsoft.com/office/officeart/2005/8/colors/accent4_1" csCatId="accent4" phldr="1"/>
-      <dgm:spPr/>
-      <dgm:t>
-        <a:bodyPr/>
-        <a:lstStyle/>
-        <a:p>
-          <a:endParaRPr lang="en-US"/>
-        </a:p>
-      </dgm:t>
-    </dgm:pt>
-    <dgm:pt modelId="{170C0135-3A94-4623-AA81-735573228628}">
-      <dgm:prSet phldrT="[Text]"/>
-      <dgm:spPr/>
-      <dgm:t>
-        <a:bodyPr/>
-        <a:lstStyle/>
-        <a:p>
-          <a:r>
-            <a:rPr lang="en-US" dirty="0"/>
-            <a:t>Group A</a:t>
-          </a:r>
-        </a:p>
-      </dgm:t>
-      <dgm:extLst>
-        <a:ext uri="{E40237B7-FDA0-4F09-8148-C483321AD2D9}">
-          <dgm14:cNvPr xmlns:dgm14="http://schemas.microsoft.com/office/drawing/2010/diagram" id="0" name="" title="Group A"/>
-        </a:ext>
-      </dgm:extLst>
-    </dgm:pt>
-    <dgm:pt modelId="{7EDBC624-DFE3-497D-829C-08721ACED330}" type="parTrans" cxnId="{22A430BA-B6E0-4052-AE0E-A81596E2528E}">
-      <dgm:prSet/>
-      <dgm:spPr/>
-      <dgm:t>
-        <a:bodyPr/>
-        <a:lstStyle/>
-        <a:p>
-          <a:endParaRPr lang="en-US"/>
-        </a:p>
-      </dgm:t>
-    </dgm:pt>
-    <dgm:pt modelId="{D38474F5-0992-4D39-B19C-1F963AEBACD2}" type="sibTrans" cxnId="{22A430BA-B6E0-4052-AE0E-A81596E2528E}">
-      <dgm:prSet/>
-      <dgm:spPr/>
-      <dgm:t>
-        <a:bodyPr/>
-        <a:lstStyle/>
-        <a:p>
-          <a:endParaRPr lang="en-US"/>
-        </a:p>
-      </dgm:t>
-    </dgm:pt>
-    <dgm:pt modelId="{B8E35523-DEC4-40C5-AD71-C446E3CF02A7}">
-      <dgm:prSet phldrT="[Text]"/>
-      <dgm:spPr/>
-      <dgm:t>
-        <a:bodyPr/>
-        <a:lstStyle/>
-        <a:p>
-          <a:r>
-            <a:rPr lang="en-US" dirty="0"/>
-            <a:t>Task 1</a:t>
-          </a:r>
-        </a:p>
-      </dgm:t>
-      <dgm:extLst>
-        <a:ext uri="{E40237B7-FDA0-4F09-8148-C483321AD2D9}">
-          <dgm14:cNvPr xmlns:dgm14="http://schemas.microsoft.com/office/drawing/2010/diagram" id="0" name="" title="Task 1"/>
-        </a:ext>
-      </dgm:extLst>
-    </dgm:pt>
-    <dgm:pt modelId="{E38275A8-6585-473D-8CD2-46E571691CE8}" type="parTrans" cxnId="{74BF261D-E0A3-43A7-83EB-85FEEF0798DA}">
-      <dgm:prSet/>
-      <dgm:spPr/>
-      <dgm:t>
-        <a:bodyPr/>
-        <a:lstStyle/>
-        <a:p>
-          <a:endParaRPr lang="en-US"/>
-        </a:p>
-      </dgm:t>
-    </dgm:pt>
-    <dgm:pt modelId="{2EEF7558-FF6A-4D97-B16B-E787F09F42D0}" type="sibTrans" cxnId="{74BF261D-E0A3-43A7-83EB-85FEEF0798DA}">
-      <dgm:prSet/>
-      <dgm:spPr/>
-      <dgm:t>
-        <a:bodyPr/>
-        <a:lstStyle/>
-        <a:p>
-          <a:endParaRPr lang="en-US"/>
-        </a:p>
-      </dgm:t>
-      <dgm:extLst>
-        <a:ext uri="{E40237B7-FDA0-4F09-8148-C483321AD2D9}">
-          <dgm14:cNvPr xmlns:dgm14="http://schemas.microsoft.com/office/drawing/2010/diagram" id="0" name="" title="Colored circle connected to tasks"/>
-        </a:ext>
-      </dgm:extLst>
-    </dgm:pt>
-    <dgm:pt modelId="{2551E4CB-EB09-450C-9132-37387398D945}">
-      <dgm:prSet phldrT="[Text]"/>
-      <dgm:spPr/>
-      <dgm:t>
-        <a:bodyPr/>
-        <a:lstStyle/>
-        <a:p>
-          <a:r>
-            <a:rPr lang="en-US" dirty="0"/>
-            <a:t>Task 2</a:t>
-          </a:r>
-        </a:p>
-      </dgm:t>
-      <dgm:extLst>
-        <a:ext uri="{E40237B7-FDA0-4F09-8148-C483321AD2D9}">
-          <dgm14:cNvPr xmlns:dgm14="http://schemas.microsoft.com/office/drawing/2010/diagram" id="0" name="" title="Task 2"/>
-        </a:ext>
-      </dgm:extLst>
-    </dgm:pt>
-    <dgm:pt modelId="{FDDC1A66-5C2F-4161-9EE0-50E6AE6B3566}" type="parTrans" cxnId="{1C13D7DA-244F-475B-A626-FFEF1E3983D1}">
-      <dgm:prSet/>
-      <dgm:spPr/>
-      <dgm:t>
-        <a:bodyPr/>
-        <a:lstStyle/>
-        <a:p>
-          <a:endParaRPr lang="en-US"/>
-        </a:p>
-      </dgm:t>
-    </dgm:pt>
-    <dgm:pt modelId="{B47B7453-52D0-4E8E-A0EE-5E0C42B9531D}" type="sibTrans" cxnId="{1C13D7DA-244F-475B-A626-FFEF1E3983D1}">
-      <dgm:prSet/>
-      <dgm:spPr/>
-      <dgm:t>
-        <a:bodyPr/>
-        <a:lstStyle/>
-        <a:p>
-          <a:endParaRPr lang="en-US"/>
-        </a:p>
-      </dgm:t>
-      <dgm:extLst>
-        <a:ext uri="{E40237B7-FDA0-4F09-8148-C483321AD2D9}">
-          <dgm14:cNvPr xmlns:dgm14="http://schemas.microsoft.com/office/drawing/2010/diagram" id="0" name="" title="Colored circle connected to tasks"/>
-        </a:ext>
-      </dgm:extLst>
-    </dgm:pt>
-    <dgm:pt modelId="{57FC35C8-C6CB-4C82-BE0F-B92E4ECAE64D}">
-      <dgm:prSet phldrT="[Text]"/>
-      <dgm:spPr/>
-      <dgm:t>
-        <a:bodyPr/>
-        <a:lstStyle/>
-        <a:p>
-          <a:r>
-            <a:rPr lang="en-US" dirty="0"/>
-            <a:t>Task 3</a:t>
-          </a:r>
-        </a:p>
-      </dgm:t>
-      <dgm:extLst>
-        <a:ext uri="{E40237B7-FDA0-4F09-8148-C483321AD2D9}">
-          <dgm14:cNvPr xmlns:dgm14="http://schemas.microsoft.com/office/drawing/2010/diagram" id="0" name="" title="Task 3"/>
-        </a:ext>
-      </dgm:extLst>
-    </dgm:pt>
-    <dgm:pt modelId="{DCE6D27B-E846-4331-8F79-CDC1E8DDD09A}" type="parTrans" cxnId="{B410F203-BF34-4790-B774-CBB246AFFDF3}">
-      <dgm:prSet/>
-      <dgm:spPr/>
-      <dgm:t>
-        <a:bodyPr/>
-        <a:lstStyle/>
-        <a:p>
-          <a:endParaRPr lang="en-US"/>
-        </a:p>
-      </dgm:t>
-    </dgm:pt>
-    <dgm:pt modelId="{E3DD98F3-578A-483D-B82A-920BD328FE4E}" type="sibTrans" cxnId="{B410F203-BF34-4790-B774-CBB246AFFDF3}">
-      <dgm:prSet/>
-      <dgm:spPr/>
-      <dgm:t>
-        <a:bodyPr/>
-        <a:lstStyle/>
-        <a:p>
-          <a:endParaRPr lang="en-US"/>
-        </a:p>
-      </dgm:t>
-      <dgm:extLst>
-        <a:ext uri="{E40237B7-FDA0-4F09-8148-C483321AD2D9}">
-          <dgm14:cNvPr xmlns:dgm14="http://schemas.microsoft.com/office/drawing/2010/diagram" id="0" name="" title="Colored circle connected to tasks"/>
-        </a:ext>
-      </dgm:extLst>
-    </dgm:pt>
-    <dgm:pt modelId="{061D020E-2B5D-4C0D-9DFD-684837CC0BCE}" type="pres">
-      <dgm:prSet presAssocID="{D44E9E87-B9B9-4324-8110-FB781FB2AAAE}" presName="Name0" presStyleCnt="0">
-        <dgm:presLayoutVars>
-          <dgm:chMax val="1"/>
-          <dgm:dir/>
-          <dgm:animLvl val="ctr"/>
-          <dgm:resizeHandles val="exact"/>
-        </dgm:presLayoutVars>
-      </dgm:prSet>
-      <dgm:spPr/>
-    </dgm:pt>
-    <dgm:pt modelId="{698F6F3C-42F1-48FA-9425-25042679391F}" type="pres">
-      <dgm:prSet presAssocID="{170C0135-3A94-4623-AA81-735573228628}" presName="centerShape" presStyleLbl="node0" presStyleIdx="0" presStyleCnt="1"/>
-      <dgm:spPr/>
-    </dgm:pt>
-    <dgm:pt modelId="{5E4B35E6-EA27-424E-89EC-46D0A40F2772}" type="pres">
-      <dgm:prSet presAssocID="{B8E35523-DEC4-40C5-AD71-C446E3CF02A7}" presName="node" presStyleLbl="node1" presStyleIdx="0" presStyleCnt="3">
-        <dgm:presLayoutVars>
-          <dgm:bulletEnabled val="1"/>
-        </dgm:presLayoutVars>
-      </dgm:prSet>
-      <dgm:spPr/>
-    </dgm:pt>
-    <dgm:pt modelId="{8B180F40-4EFD-493D-838A-C88D7BCC1034}" type="pres">
-      <dgm:prSet presAssocID="{B8E35523-DEC4-40C5-AD71-C446E3CF02A7}" presName="dummy" presStyleCnt="0"/>
-      <dgm:spPr/>
-    </dgm:pt>
-    <dgm:pt modelId="{98E28826-978E-4A6B-8422-B9CC30E49F37}" type="pres">
-      <dgm:prSet presAssocID="{2EEF7558-FF6A-4D97-B16B-E787F09F42D0}" presName="sibTrans" presStyleLbl="sibTrans2D1" presStyleIdx="0" presStyleCnt="3"/>
-      <dgm:spPr/>
-    </dgm:pt>
-    <dgm:pt modelId="{8FAC1D8D-CE9C-45FC-86D2-26F007C6DD34}" type="pres">
-      <dgm:prSet presAssocID="{2551E4CB-EB09-450C-9132-37387398D945}" presName="node" presStyleLbl="node1" presStyleIdx="1" presStyleCnt="3">
-        <dgm:presLayoutVars>
-          <dgm:bulletEnabled val="1"/>
-        </dgm:presLayoutVars>
-      </dgm:prSet>
-      <dgm:spPr/>
-    </dgm:pt>
-    <dgm:pt modelId="{582D627C-FAD1-4F2D-897E-C08848385BAA}" type="pres">
-      <dgm:prSet presAssocID="{2551E4CB-EB09-450C-9132-37387398D945}" presName="dummy" presStyleCnt="0"/>
-      <dgm:spPr/>
-    </dgm:pt>
-    <dgm:pt modelId="{7BB1C934-CD6E-4389-AB60-D55326BC8302}" type="pres">
-      <dgm:prSet presAssocID="{B47B7453-52D0-4E8E-A0EE-5E0C42B9531D}" presName="sibTrans" presStyleLbl="sibTrans2D1" presStyleIdx="1" presStyleCnt="3"/>
-      <dgm:spPr/>
-    </dgm:pt>
-    <dgm:pt modelId="{5D851138-FE51-4A19-A149-11A0DEA29AF5}" type="pres">
-      <dgm:prSet presAssocID="{57FC35C8-C6CB-4C82-BE0F-B92E4ECAE64D}" presName="node" presStyleLbl="node1" presStyleIdx="2" presStyleCnt="3">
-        <dgm:presLayoutVars>
-          <dgm:bulletEnabled val="1"/>
-        </dgm:presLayoutVars>
-      </dgm:prSet>
-      <dgm:spPr/>
-    </dgm:pt>
-    <dgm:pt modelId="{87F2D62F-9758-428E-A82A-F136F721FE64}" type="pres">
-      <dgm:prSet presAssocID="{57FC35C8-C6CB-4C82-BE0F-B92E4ECAE64D}" presName="dummy" presStyleCnt="0"/>
-      <dgm:spPr/>
-    </dgm:pt>
-    <dgm:pt modelId="{0162A7CA-7E03-4A22-95EF-970E5873DB72}" type="pres">
-      <dgm:prSet presAssocID="{E3DD98F3-578A-483D-B82A-920BD328FE4E}" presName="sibTrans" presStyleLbl="sibTrans2D1" presStyleIdx="2" presStyleCnt="3"/>
-      <dgm:spPr/>
-    </dgm:pt>
-  </dgm:ptLst>
-  <dgm:cxnLst>
-    <dgm:cxn modelId="{B410F203-BF34-4790-B774-CBB246AFFDF3}" srcId="{170C0135-3A94-4623-AA81-735573228628}" destId="{57FC35C8-C6CB-4C82-BE0F-B92E4ECAE64D}" srcOrd="2" destOrd="0" parTransId="{DCE6D27B-E846-4331-8F79-CDC1E8DDD09A}" sibTransId="{E3DD98F3-578A-483D-B82A-920BD328FE4E}"/>
-    <dgm:cxn modelId="{74BF261D-E0A3-43A7-83EB-85FEEF0798DA}" srcId="{170C0135-3A94-4623-AA81-735573228628}" destId="{B8E35523-DEC4-40C5-AD71-C446E3CF02A7}" srcOrd="0" destOrd="0" parTransId="{E38275A8-6585-473D-8CD2-46E571691CE8}" sibTransId="{2EEF7558-FF6A-4D97-B16B-E787F09F42D0}"/>
-    <dgm:cxn modelId="{6CDC671E-280C-428C-8CDE-020C21062DCD}" type="presOf" srcId="{B47B7453-52D0-4E8E-A0EE-5E0C42B9531D}" destId="{7BB1C934-CD6E-4389-AB60-D55326BC8302}" srcOrd="0" destOrd="0" presId="urn:microsoft.com/office/officeart/2005/8/layout/radial6"/>
-    <dgm:cxn modelId="{B3242627-1817-4128-948A-586A1D28CAEC}" type="presOf" srcId="{B8E35523-DEC4-40C5-AD71-C446E3CF02A7}" destId="{5E4B35E6-EA27-424E-89EC-46D0A40F2772}" srcOrd="0" destOrd="0" presId="urn:microsoft.com/office/officeart/2005/8/layout/radial6"/>
-    <dgm:cxn modelId="{8854DE2B-B2DC-403D-BBB5-9DAEAD86C05D}" type="presOf" srcId="{2551E4CB-EB09-450C-9132-37387398D945}" destId="{8FAC1D8D-CE9C-45FC-86D2-26F007C6DD34}" srcOrd="0" destOrd="0" presId="urn:microsoft.com/office/officeart/2005/8/layout/radial6"/>
-    <dgm:cxn modelId="{6659EF34-3EF6-4AEC-872C-F63DB702B33C}" type="presOf" srcId="{170C0135-3A94-4623-AA81-735573228628}" destId="{698F6F3C-42F1-48FA-9425-25042679391F}" srcOrd="0" destOrd="0" presId="urn:microsoft.com/office/officeart/2005/8/layout/radial6"/>
-    <dgm:cxn modelId="{12D27D35-EFB9-4862-B45A-F4ECD3DD2B5A}" type="presOf" srcId="{57FC35C8-C6CB-4C82-BE0F-B92E4ECAE64D}" destId="{5D851138-FE51-4A19-A149-11A0DEA29AF5}" srcOrd="0" destOrd="0" presId="urn:microsoft.com/office/officeart/2005/8/layout/radial6"/>
-    <dgm:cxn modelId="{AC35BE37-19DB-4CD7-BE2E-6D0C18095769}" type="presOf" srcId="{2EEF7558-FF6A-4D97-B16B-E787F09F42D0}" destId="{98E28826-978E-4A6B-8422-B9CC30E49F37}" srcOrd="0" destOrd="0" presId="urn:microsoft.com/office/officeart/2005/8/layout/radial6"/>
-    <dgm:cxn modelId="{61768550-6FA2-421B-BF53-22E629655CE4}" type="presOf" srcId="{D44E9E87-B9B9-4324-8110-FB781FB2AAAE}" destId="{061D020E-2B5D-4C0D-9DFD-684837CC0BCE}" srcOrd="0" destOrd="0" presId="urn:microsoft.com/office/officeart/2005/8/layout/radial6"/>
-    <dgm:cxn modelId="{22A430BA-B6E0-4052-AE0E-A81596E2528E}" srcId="{D44E9E87-B9B9-4324-8110-FB781FB2AAAE}" destId="{170C0135-3A94-4623-AA81-735573228628}" srcOrd="0" destOrd="0" parTransId="{7EDBC624-DFE3-497D-829C-08721ACED330}" sibTransId="{D38474F5-0992-4D39-B19C-1F963AEBACD2}"/>
-    <dgm:cxn modelId="{51173CC8-36DE-4780-A234-53464D5D6F33}" type="presOf" srcId="{E3DD98F3-578A-483D-B82A-920BD328FE4E}" destId="{0162A7CA-7E03-4A22-95EF-970E5873DB72}" srcOrd="0" destOrd="0" presId="urn:microsoft.com/office/officeart/2005/8/layout/radial6"/>
-    <dgm:cxn modelId="{1C13D7DA-244F-475B-A626-FFEF1E3983D1}" srcId="{170C0135-3A94-4623-AA81-735573228628}" destId="{2551E4CB-EB09-450C-9132-37387398D945}" srcOrd="1" destOrd="0" parTransId="{FDDC1A66-5C2F-4161-9EE0-50E6AE6B3566}" sibTransId="{B47B7453-52D0-4E8E-A0EE-5E0C42B9531D}"/>
-    <dgm:cxn modelId="{2006E8EE-D69C-49C4-9C1A-63E4C2D2FE70}" type="presParOf" srcId="{061D020E-2B5D-4C0D-9DFD-684837CC0BCE}" destId="{698F6F3C-42F1-48FA-9425-25042679391F}" srcOrd="0" destOrd="0" presId="urn:microsoft.com/office/officeart/2005/8/layout/radial6"/>
-    <dgm:cxn modelId="{EE444B99-244F-42E7-AA40-8FD32874A39D}" type="presParOf" srcId="{061D020E-2B5D-4C0D-9DFD-684837CC0BCE}" destId="{5E4B35E6-EA27-424E-89EC-46D0A40F2772}" srcOrd="1" destOrd="0" presId="urn:microsoft.com/office/officeart/2005/8/layout/radial6"/>
-    <dgm:cxn modelId="{99419F13-53BB-4729-8707-844D77FAB6C9}" type="presParOf" srcId="{061D020E-2B5D-4C0D-9DFD-684837CC0BCE}" destId="{8B180F40-4EFD-493D-838A-C88D7BCC1034}" srcOrd="2" destOrd="0" presId="urn:microsoft.com/office/officeart/2005/8/layout/radial6"/>
-    <dgm:cxn modelId="{72F9C11E-349E-41A4-8872-970B174ACBCC}" type="presParOf" srcId="{061D020E-2B5D-4C0D-9DFD-684837CC0BCE}" destId="{98E28826-978E-4A6B-8422-B9CC30E49F37}" srcOrd="3" destOrd="0" presId="urn:microsoft.com/office/officeart/2005/8/layout/radial6"/>
-    <dgm:cxn modelId="{C371A4E7-D97D-4C5F-A2DA-7F6E5149F6DF}" type="presParOf" srcId="{061D020E-2B5D-4C0D-9DFD-684837CC0BCE}" destId="{8FAC1D8D-CE9C-45FC-86D2-26F007C6DD34}" srcOrd="4" destOrd="0" presId="urn:microsoft.com/office/officeart/2005/8/layout/radial6"/>
-    <dgm:cxn modelId="{B5A8D312-8F6F-4318-93AB-0CB2020E478A}" type="presParOf" srcId="{061D020E-2B5D-4C0D-9DFD-684837CC0BCE}" destId="{582D627C-FAD1-4F2D-897E-C08848385BAA}" srcOrd="5" destOrd="0" presId="urn:microsoft.com/office/officeart/2005/8/layout/radial6"/>
-    <dgm:cxn modelId="{7E8E1789-B60B-4405-8CD8-D17C409DA86A}" type="presParOf" srcId="{061D020E-2B5D-4C0D-9DFD-684837CC0BCE}" destId="{7BB1C934-CD6E-4389-AB60-D55326BC8302}" srcOrd="6" destOrd="0" presId="urn:microsoft.com/office/officeart/2005/8/layout/radial6"/>
-    <dgm:cxn modelId="{A0E89A57-7782-4D03-A9CB-2788C16E7736}" type="presParOf" srcId="{061D020E-2B5D-4C0D-9DFD-684837CC0BCE}" destId="{5D851138-FE51-4A19-A149-11A0DEA29AF5}" srcOrd="7" destOrd="0" presId="urn:microsoft.com/office/officeart/2005/8/layout/radial6"/>
-    <dgm:cxn modelId="{AD4ADAE1-D633-4009-8B9D-2CEF29E3F76C}" type="presParOf" srcId="{061D020E-2B5D-4C0D-9DFD-684837CC0BCE}" destId="{87F2D62F-9758-428E-A82A-F136F721FE64}" srcOrd="8" destOrd="0" presId="urn:microsoft.com/office/officeart/2005/8/layout/radial6"/>
-    <dgm:cxn modelId="{6143C6D3-B1F0-4A53-B4E2-F06938629FAC}" type="presParOf" srcId="{061D020E-2B5D-4C0D-9DFD-684837CC0BCE}" destId="{0162A7CA-7E03-4A22-95EF-970E5873DB72}" srcOrd="9" destOrd="0" presId="urn:microsoft.com/office/officeart/2005/8/layout/radial6"/>
-  </dgm:cxnLst>
-  <dgm:bg/>
-  <dgm:whole/>
-  <dgm:extLst>
-    <a:ext uri="http://schemas.microsoft.com/office/drawing/2008/diagram">
-      <dsp:dataModelExt xmlns:dsp="http://schemas.microsoft.com/office/drawing/2008/diagram" relId="rId6" minVer="http://schemas.openxmlformats.org/drawingml/2006/diagram"/>
-    </a:ext>
-  </dgm:extLst>
-</dgm:dataModel>
-</file>
-
-<file path=ppt/diagrams/drawing1.xml><?xml version="1.0" encoding="utf-8"?>
-<dsp:drawing xmlns:dgm="http://schemas.openxmlformats.org/drawingml/2006/diagram" xmlns:dsp="http://schemas.microsoft.com/office/drawing/2008/diagram" xmlns:a="http://schemas.openxmlformats.org/drawingml/2006/main">
-  <dsp:spTree>
-    <dsp:nvGrpSpPr>
-      <dsp:cNvPr id="0" name=""/>
-      <dsp:cNvGrpSpPr/>
-    </dsp:nvGrpSpPr>
-    <dsp:grpSpPr/>
-    <dsp:sp modelId="{0162A7CA-7E03-4A22-95EF-970E5873DB72}">
-      <dsp:nvSpPr>
-        <dsp:cNvPr id="0" name=""/>
-        <dsp:cNvSpPr/>
-      </dsp:nvSpPr>
-      <dsp:spPr>
-        <a:xfrm>
-          <a:off x="554893" y="564188"/>
-          <a:ext cx="3765425" cy="3765425"/>
-        </a:xfrm>
-        <a:prstGeom prst="blockArc">
-          <a:avLst>
-            <a:gd name="adj1" fmla="val 9000000"/>
-            <a:gd name="adj2" fmla="val 16200000"/>
-            <a:gd name="adj3" fmla="val 4639"/>
-          </a:avLst>
-        </a:prstGeom>
-        <a:solidFill>
-          <a:schemeClr val="accent4">
-            <a:tint val="60000"/>
-            <a:hueOff val="0"/>
-            <a:satOff val="0"/>
-            <a:lumOff val="0"/>
-            <a:alphaOff val="0"/>
-          </a:schemeClr>
-        </a:solidFill>
-        <a:ln>
-          <a:noFill/>
-        </a:ln>
-        <a:effectLst/>
-      </dsp:spPr>
-      <dsp:style>
-        <a:lnRef idx="0">
-          <a:scrgbClr r="0" g="0" b="0"/>
-        </a:lnRef>
-        <a:fillRef idx="1">
-          <a:scrgbClr r="0" g="0" b="0"/>
-        </a:fillRef>
-        <a:effectRef idx="0">
-          <a:scrgbClr r="0" g="0" b="0"/>
-        </a:effectRef>
-        <a:fontRef idx="minor">
-          <a:schemeClr val="lt1"/>
-        </a:fontRef>
-      </dsp:style>
-    </dsp:sp>
-    <dsp:sp modelId="{7BB1C934-CD6E-4389-AB60-D55326BC8302}">
-      <dsp:nvSpPr>
-        <dsp:cNvPr id="0" name=""/>
-        <dsp:cNvSpPr/>
-      </dsp:nvSpPr>
-      <dsp:spPr>
-        <a:xfrm>
-          <a:off x="554893" y="564188"/>
-          <a:ext cx="3765425" cy="3765425"/>
-        </a:xfrm>
-        <a:prstGeom prst="blockArc">
-          <a:avLst>
-            <a:gd name="adj1" fmla="val 1800000"/>
-            <a:gd name="adj2" fmla="val 9000000"/>
-            <a:gd name="adj3" fmla="val 4639"/>
-          </a:avLst>
-        </a:prstGeom>
-        <a:solidFill>
-          <a:schemeClr val="accent4">
-            <a:tint val="60000"/>
-            <a:hueOff val="0"/>
-            <a:satOff val="0"/>
-            <a:lumOff val="0"/>
-            <a:alphaOff val="0"/>
-          </a:schemeClr>
-        </a:solidFill>
-        <a:ln>
-          <a:noFill/>
-        </a:ln>
-        <a:effectLst/>
-      </dsp:spPr>
-      <dsp:style>
-        <a:lnRef idx="0">
-          <a:scrgbClr r="0" g="0" b="0"/>
-        </a:lnRef>
-        <a:fillRef idx="1">
-          <a:scrgbClr r="0" g="0" b="0"/>
-        </a:fillRef>
-        <a:effectRef idx="0">
-          <a:scrgbClr r="0" g="0" b="0"/>
-        </a:effectRef>
-        <a:fontRef idx="minor">
-          <a:schemeClr val="lt1"/>
-        </a:fontRef>
-      </dsp:style>
-    </dsp:sp>
-    <dsp:sp modelId="{98E28826-978E-4A6B-8422-B9CC30E49F37}">
-      <dsp:nvSpPr>
-        <dsp:cNvPr id="0" name=""/>
-        <dsp:cNvSpPr/>
-      </dsp:nvSpPr>
-      <dsp:spPr>
-        <a:xfrm>
-          <a:off x="554893" y="564188"/>
-          <a:ext cx="3765425" cy="3765425"/>
-        </a:xfrm>
-        <a:prstGeom prst="blockArc">
-          <a:avLst>
-            <a:gd name="adj1" fmla="val 16200000"/>
-            <a:gd name="adj2" fmla="val 1800000"/>
-            <a:gd name="adj3" fmla="val 4639"/>
-          </a:avLst>
-        </a:prstGeom>
-        <a:solidFill>
-          <a:schemeClr val="accent4">
-            <a:tint val="60000"/>
-            <a:hueOff val="0"/>
-            <a:satOff val="0"/>
-            <a:lumOff val="0"/>
-            <a:alphaOff val="0"/>
-          </a:schemeClr>
-        </a:solidFill>
-        <a:ln>
-          <a:noFill/>
-        </a:ln>
-        <a:effectLst/>
-      </dsp:spPr>
-      <dsp:style>
-        <a:lnRef idx="0">
-          <a:scrgbClr r="0" g="0" b="0"/>
-        </a:lnRef>
-        <a:fillRef idx="1">
-          <a:scrgbClr r="0" g="0" b="0"/>
-        </a:fillRef>
-        <a:effectRef idx="0">
-          <a:scrgbClr r="0" g="0" b="0"/>
-        </a:effectRef>
-        <a:fontRef idx="minor">
-          <a:schemeClr val="lt1"/>
-        </a:fontRef>
-      </dsp:style>
-    </dsp:sp>
-    <dsp:sp modelId="{698F6F3C-42F1-48FA-9425-25042679391F}">
-      <dsp:nvSpPr>
-        <dsp:cNvPr id="0" name=""/>
-        <dsp:cNvSpPr/>
-      </dsp:nvSpPr>
-      <dsp:spPr>
-        <a:xfrm>
-          <a:off x="1571113" y="1580408"/>
-          <a:ext cx="1732985" cy="1732985"/>
-        </a:xfrm>
-        <a:prstGeom prst="ellipse">
-          <a:avLst/>
-        </a:prstGeom>
-        <a:solidFill>
-          <a:schemeClr val="lt1">
-            <a:hueOff val="0"/>
-            <a:satOff val="0"/>
-            <a:lumOff val="0"/>
-            <a:alphaOff val="0"/>
-          </a:schemeClr>
-        </a:solidFill>
-        <a:ln w="10795" cap="flat" cmpd="sng" algn="ctr">
-          <a:solidFill>
-            <a:schemeClr val="accent4">
-              <a:shade val="80000"/>
-              <a:hueOff val="0"/>
-              <a:satOff val="0"/>
-              <a:lumOff val="0"/>
-              <a:alphaOff val="0"/>
-            </a:schemeClr>
-          </a:solidFill>
-          <a:prstDash val="solid"/>
-        </a:ln>
-        <a:effectLst/>
-      </dsp:spPr>
-      <dsp:style>
-        <a:lnRef idx="2">
-          <a:scrgbClr r="0" g="0" b="0"/>
-        </a:lnRef>
-        <a:fillRef idx="1">
-          <a:scrgbClr r="0" g="0" b="0"/>
-        </a:fillRef>
-        <a:effectRef idx="0">
-          <a:scrgbClr r="0" g="0" b="0"/>
-        </a:effectRef>
-        <a:fontRef idx="minor">
-          <a:schemeClr val="lt1"/>
-        </a:fontRef>
-      </dsp:style>
-      <dsp:txBody>
-        <a:bodyPr spcFirstLastPara="0" vert="horz" wrap="square" lIns="41910" tIns="41910" rIns="41910" bIns="41910" numCol="1" spcCol="1270" anchor="ctr" anchorCtr="0">
-          <a:noAutofit/>
-        </a:bodyPr>
-        <a:lstStyle/>
-        <a:p>
-          <a:pPr marL="0" lvl="0" indent="0" algn="ctr" defTabSz="1466850">
-            <a:lnSpc>
-              <a:spcPct val="90000"/>
-            </a:lnSpc>
-            <a:spcBef>
-              <a:spcPct val="0"/>
-            </a:spcBef>
-            <a:spcAft>
-              <a:spcPct val="35000"/>
-            </a:spcAft>
-            <a:buNone/>
-          </a:pPr>
-          <a:r>
-            <a:rPr lang="en-US" sz="3300" kern="1200" dirty="0"/>
-            <a:t>Group A</a:t>
-          </a:r>
-        </a:p>
-      </dsp:txBody>
-      <dsp:txXfrm>
-        <a:off x="1824903" y="1834198"/>
-        <a:ext cx="1225405" cy="1225405"/>
-      </dsp:txXfrm>
-    </dsp:sp>
-    <dsp:sp modelId="{5E4B35E6-EA27-424E-89EC-46D0A40F2772}">
-      <dsp:nvSpPr>
-        <dsp:cNvPr id="0" name=""/>
-        <dsp:cNvSpPr/>
-      </dsp:nvSpPr>
-      <dsp:spPr>
-        <a:xfrm>
-          <a:off x="1831061" y="1314"/>
-          <a:ext cx="1213089" cy="1213089"/>
-        </a:xfrm>
-        <a:prstGeom prst="ellipse">
-          <a:avLst/>
-        </a:prstGeom>
-        <a:solidFill>
-          <a:schemeClr val="lt1">
-            <a:hueOff val="0"/>
-            <a:satOff val="0"/>
-            <a:lumOff val="0"/>
-            <a:alphaOff val="0"/>
-          </a:schemeClr>
-        </a:solidFill>
-        <a:ln w="10795" cap="flat" cmpd="sng" algn="ctr">
-          <a:solidFill>
-            <a:schemeClr val="accent4">
-              <a:shade val="80000"/>
-              <a:hueOff val="0"/>
-              <a:satOff val="0"/>
-              <a:lumOff val="0"/>
-              <a:alphaOff val="0"/>
-            </a:schemeClr>
-          </a:solidFill>
-          <a:prstDash val="solid"/>
-        </a:ln>
-        <a:effectLst/>
-      </dsp:spPr>
-      <dsp:style>
-        <a:lnRef idx="2">
-          <a:scrgbClr r="0" g="0" b="0"/>
-        </a:lnRef>
-        <a:fillRef idx="1">
-          <a:scrgbClr r="0" g="0" b="0"/>
-        </a:fillRef>
-        <a:effectRef idx="0">
-          <a:scrgbClr r="0" g="0" b="0"/>
-        </a:effectRef>
-        <a:fontRef idx="minor">
-          <a:schemeClr val="lt1"/>
-        </a:fontRef>
-      </dsp:style>
-      <dsp:txBody>
-        <a:bodyPr spcFirstLastPara="0" vert="horz" wrap="square" lIns="35560" tIns="35560" rIns="35560" bIns="35560" numCol="1" spcCol="1270" anchor="ctr" anchorCtr="0">
-          <a:noAutofit/>
-        </a:bodyPr>
-        <a:lstStyle/>
-        <a:p>
-          <a:pPr marL="0" lvl="0" indent="0" algn="ctr" defTabSz="1244600">
-            <a:lnSpc>
-              <a:spcPct val="90000"/>
-            </a:lnSpc>
-            <a:spcBef>
-              <a:spcPct val="0"/>
-            </a:spcBef>
-            <a:spcAft>
-              <a:spcPct val="35000"/>
-            </a:spcAft>
-            <a:buNone/>
-          </a:pPr>
-          <a:r>
-            <a:rPr lang="en-US" sz="2800" kern="1200" dirty="0"/>
-            <a:t>Task 1</a:t>
-          </a:r>
-        </a:p>
-      </dsp:txBody>
-      <dsp:txXfrm>
-        <a:off x="2008714" y="178967"/>
-        <a:ext cx="857783" cy="857783"/>
-      </dsp:txXfrm>
-    </dsp:sp>
-    <dsp:sp modelId="{8FAC1D8D-CE9C-45FC-86D2-26F007C6DD34}">
-      <dsp:nvSpPr>
-        <dsp:cNvPr id="0" name=""/>
-        <dsp:cNvSpPr/>
-      </dsp:nvSpPr>
-      <dsp:spPr>
-        <a:xfrm>
-          <a:off x="3423717" y="2759876"/>
-          <a:ext cx="1213089" cy="1213089"/>
-        </a:xfrm>
-        <a:prstGeom prst="ellipse">
-          <a:avLst/>
-        </a:prstGeom>
-        <a:solidFill>
-          <a:schemeClr val="lt1">
-            <a:hueOff val="0"/>
-            <a:satOff val="0"/>
-            <a:lumOff val="0"/>
-            <a:alphaOff val="0"/>
-          </a:schemeClr>
-        </a:solidFill>
-        <a:ln w="10795" cap="flat" cmpd="sng" algn="ctr">
-          <a:solidFill>
-            <a:schemeClr val="accent4">
-              <a:shade val="80000"/>
-              <a:hueOff val="0"/>
-              <a:satOff val="0"/>
-              <a:lumOff val="0"/>
-              <a:alphaOff val="0"/>
-            </a:schemeClr>
-          </a:solidFill>
-          <a:prstDash val="solid"/>
-        </a:ln>
-        <a:effectLst/>
-      </dsp:spPr>
-      <dsp:style>
-        <a:lnRef idx="2">
-          <a:scrgbClr r="0" g="0" b="0"/>
-        </a:lnRef>
-        <a:fillRef idx="1">
-          <a:scrgbClr r="0" g="0" b="0"/>
-        </a:fillRef>
-        <a:effectRef idx="0">
-          <a:scrgbClr r="0" g="0" b="0"/>
-        </a:effectRef>
-        <a:fontRef idx="minor">
-          <a:schemeClr val="lt1"/>
-        </a:fontRef>
-      </dsp:style>
-      <dsp:txBody>
-        <a:bodyPr spcFirstLastPara="0" vert="horz" wrap="square" lIns="35560" tIns="35560" rIns="35560" bIns="35560" numCol="1" spcCol="1270" anchor="ctr" anchorCtr="0">
-          <a:noAutofit/>
-        </a:bodyPr>
-        <a:lstStyle/>
-        <a:p>
-          <a:pPr marL="0" lvl="0" indent="0" algn="ctr" defTabSz="1244600">
-            <a:lnSpc>
-              <a:spcPct val="90000"/>
-            </a:lnSpc>
-            <a:spcBef>
-              <a:spcPct val="0"/>
-            </a:spcBef>
-            <a:spcAft>
-              <a:spcPct val="35000"/>
-            </a:spcAft>
-            <a:buNone/>
-          </a:pPr>
-          <a:r>
-            <a:rPr lang="en-US" sz="2800" kern="1200" dirty="0"/>
-            <a:t>Task 2</a:t>
-          </a:r>
-        </a:p>
-      </dsp:txBody>
-      <dsp:txXfrm>
-        <a:off x="3601370" y="2937529"/>
-        <a:ext cx="857783" cy="857783"/>
-      </dsp:txXfrm>
-    </dsp:sp>
-    <dsp:sp modelId="{5D851138-FE51-4A19-A149-11A0DEA29AF5}">
-      <dsp:nvSpPr>
-        <dsp:cNvPr id="0" name=""/>
-        <dsp:cNvSpPr/>
-      </dsp:nvSpPr>
-      <dsp:spPr>
-        <a:xfrm>
-          <a:off x="238404" y="2759876"/>
-          <a:ext cx="1213089" cy="1213089"/>
-        </a:xfrm>
-        <a:prstGeom prst="ellipse">
-          <a:avLst/>
-        </a:prstGeom>
-        <a:solidFill>
-          <a:schemeClr val="lt1">
-            <a:hueOff val="0"/>
-            <a:satOff val="0"/>
-            <a:lumOff val="0"/>
-            <a:alphaOff val="0"/>
-          </a:schemeClr>
-        </a:solidFill>
-        <a:ln w="10795" cap="flat" cmpd="sng" algn="ctr">
-          <a:solidFill>
-            <a:schemeClr val="accent4">
-              <a:shade val="80000"/>
-              <a:hueOff val="0"/>
-              <a:satOff val="0"/>
-              <a:lumOff val="0"/>
-              <a:alphaOff val="0"/>
-            </a:schemeClr>
-          </a:solidFill>
-          <a:prstDash val="solid"/>
-        </a:ln>
-        <a:effectLst/>
-      </dsp:spPr>
-      <dsp:style>
-        <a:lnRef idx="2">
-          <a:scrgbClr r="0" g="0" b="0"/>
-        </a:lnRef>
-        <a:fillRef idx="1">
-          <a:scrgbClr r="0" g="0" b="0"/>
-        </a:fillRef>
-        <a:effectRef idx="0">
-          <a:scrgbClr r="0" g="0" b="0"/>
-        </a:effectRef>
-        <a:fontRef idx="minor">
-          <a:schemeClr val="lt1"/>
-        </a:fontRef>
-      </dsp:style>
-      <dsp:txBody>
-        <a:bodyPr spcFirstLastPara="0" vert="horz" wrap="square" lIns="35560" tIns="35560" rIns="35560" bIns="35560" numCol="1" spcCol="1270" anchor="ctr" anchorCtr="0">
-          <a:noAutofit/>
-        </a:bodyPr>
-        <a:lstStyle/>
-        <a:p>
-          <a:pPr marL="0" lvl="0" indent="0" algn="ctr" defTabSz="1244600">
-            <a:lnSpc>
-              <a:spcPct val="90000"/>
-            </a:lnSpc>
-            <a:spcBef>
-              <a:spcPct val="0"/>
-            </a:spcBef>
-            <a:spcAft>
-              <a:spcPct val="35000"/>
-            </a:spcAft>
-            <a:buNone/>
-          </a:pPr>
-          <a:r>
-            <a:rPr lang="en-US" sz="2800" kern="1200" dirty="0"/>
-            <a:t>Task 3</a:t>
-          </a:r>
-        </a:p>
-      </dsp:txBody>
-      <dsp:txXfrm>
-        <a:off x="416057" y="2937529"/>
-        <a:ext cx="857783" cy="857783"/>
-      </dsp:txXfrm>
-    </dsp:sp>
-  </dsp:spTree>
-</dsp:drawing>
-</file>
-
-<file path=ppt/diagrams/layout1.xml><?xml version="1.0" encoding="utf-8"?>
-<dgm:layoutDef xmlns:dgm="http://schemas.openxmlformats.org/drawingml/2006/diagram" xmlns:a="http://schemas.openxmlformats.org/drawingml/2006/main" uniqueId="urn:microsoft.com/office/officeart/2005/8/layout/radial6">
-  <dgm:title val=""/>
-  <dgm:desc val=""/>
-  <dgm:catLst>
-    <dgm:cat type="cycle" pri="9000"/>
-    <dgm:cat type="relationship" pri="21000"/>
-  </dgm:catLst>
-  <dgm:sampData>
-    <dgm:dataModel>
-      <dgm:ptLst>
-        <dgm:pt modelId="0" type="doc"/>
-        <dgm:pt modelId="1">
-          <dgm:prSet phldr="1"/>
-        </dgm:pt>
-        <dgm:pt modelId="11">
-          <dgm:prSet phldr="1"/>
-        </dgm:pt>
-        <dgm:pt modelId="12">
-          <dgm:prSet phldr="1"/>
-        </dgm:pt>
-        <dgm:pt modelId="13">
-          <dgm:prSet phldr="1"/>
-        </dgm:pt>
-        <dgm:pt modelId="14">
-          <dgm:prSet phldr="1"/>
-        </dgm:pt>
-      </dgm:ptLst>
-      <dgm:cxnLst>
-        <dgm:cxn modelId="2" srcId="0" destId="1" srcOrd="0" destOrd="0"/>
-        <dgm:cxn modelId="3" srcId="1" destId="11" srcOrd="0" destOrd="0"/>
-        <dgm:cxn modelId="4" srcId="1" destId="12" srcOrd="1" destOrd="0"/>
-        <dgm:cxn modelId="5" srcId="1" destId="13" srcOrd="2" destOrd="0"/>
-        <dgm:cxn modelId="6" srcId="1" destId="14" srcOrd="3" destOrd="0"/>
-      </dgm:cxnLst>
-      <dgm:bg/>
-      <dgm:whole/>
-    </dgm:dataModel>
-  </dgm:sampData>
-  <dgm:styleData>
-    <dgm:dataModel>
-      <dgm:ptLst>
-        <dgm:pt modelId="0" type="doc"/>
-        <dgm:pt modelId="1"/>
-        <dgm:pt modelId="11"/>
-        <dgm:pt modelId="12"/>
-        <dgm:pt modelId="13"/>
-      </dgm:ptLst>
-      <dgm:cxnLst>
-        <dgm:cxn modelId="2" srcId="0" destId="1" srcOrd="0" destOrd="0"/>
-        <dgm:cxn modelId="15" srcId="1" destId="11" srcOrd="0" destOrd="0"/>
-        <dgm:cxn modelId="16" srcId="1" destId="12" srcOrd="1" destOrd="0"/>
-        <dgm:cxn modelId="17" srcId="1" destId="13" srcOrd="2" destOrd="0"/>
-      </dgm:cxnLst>
-      <dgm:bg/>
-      <dgm:whole/>
-    </dgm:dataModel>
-  </dgm:styleData>
-  <dgm:clrData>
-    <dgm:dataModel>
-      <dgm:ptLst>
-        <dgm:pt modelId="0" type="doc"/>
-        <dgm:pt modelId="1"/>
-        <dgm:pt modelId="11"/>
-        <dgm:pt modelId="12"/>
-        <dgm:pt modelId="13"/>
-        <dgm:pt modelId="14"/>
-        <dgm:pt modelId="15"/>
-        <dgm:pt modelId="16"/>
-      </dgm:ptLst>
-      <dgm:cxnLst>
-        <dgm:cxn modelId="2" srcId="0" destId="1" srcOrd="0" destOrd="0"/>
-        <dgm:cxn modelId="16" srcId="1" destId="11" srcOrd="0" destOrd="0"/>
-        <dgm:cxn modelId="17" srcId="1" destId="12" srcOrd="1" destOrd="0"/>
-        <dgm:cxn modelId="18" srcId="1" destId="13" srcOrd="2" destOrd="0"/>
-        <dgm:cxn modelId="19" srcId="1" destId="14" srcOrd="3" destOrd="0"/>
-        <dgm:cxn modelId="20" srcId="1" destId="15" srcOrd="4" destOrd="0"/>
-        <dgm:cxn modelId="21" srcId="1" destId="16" srcOrd="5" destOrd="0"/>
-      </dgm:cxnLst>
-      <dgm:bg/>
-      <dgm:whole/>
-    </dgm:dataModel>
-  </dgm:clrData>
-  <dgm:layoutNode name="Name0">
-    <dgm:varLst>
-      <dgm:chMax val="1"/>
-      <dgm:dir/>
-      <dgm:animLvl val="ctr"/>
-      <dgm:resizeHandles val="exact"/>
-    </dgm:varLst>
-    <dgm:choose name="Name1">
-      <dgm:if name="Name2" func="var" arg="dir" op="equ" val="norm">
-        <dgm:choose name="Name3">
-          <dgm:if name="Name4" axis="ch ch" ptType="node node" st="1 1" cnt="1 0" func="cnt" op="lte" val="1">
-            <dgm:alg type="cycle">
-              <dgm:param type="stAng" val="90"/>
-              <dgm:param type="spanAng" val="360"/>
-              <dgm:param type="ctrShpMap" val="fNode"/>
-            </dgm:alg>
-          </dgm:if>
-          <dgm:else name="Name5">
-            <dgm:alg type="cycle">
-              <dgm:param type="stAng" val="0"/>
-              <dgm:param type="spanAng" val="360"/>
-              <dgm:param type="ctrShpMap" val="fNode"/>
-            </dgm:alg>
-          </dgm:else>
-        </dgm:choose>
-      </dgm:if>
-      <dgm:else name="Name6">
-        <dgm:choose name="Name7">
-          <dgm:if name="Name8" axis="ch ch" ptType="node node" st="1 1" cnt="1 0" func="cnt" op="lte" val="1">
-            <dgm:alg type="cycle">
-              <dgm:param type="stAng" val="-90"/>
-              <dgm:param type="spanAng" val="360"/>
-              <dgm:param type="ctrShpMap" val="fNode"/>
-            </dgm:alg>
-          </dgm:if>
-          <dgm:else name="Name9">
-            <dgm:alg type="cycle">
-              <dgm:param type="stAng" val="0"/>
-              <dgm:param type="spanAng" val="-360"/>
-              <dgm:param type="ctrShpMap" val="fNode"/>
-            </dgm:alg>
-          </dgm:else>
-        </dgm:choose>
-      </dgm:else>
-    </dgm:choose>
-    <dgm:shape xmlns:r="http://schemas.openxmlformats.org/officeDocument/2006/relationships" r:blip="">
-      <dgm:adjLst/>
-    </dgm:shape>
-    <dgm:presOf/>
-    <dgm:choose name="Name10">
-      <dgm:if name="Name11" func="var" arg="dir" op="equ" val="norm">
-        <dgm:choose name="Name12">
-          <dgm:if name="Name13" axis="ch ch" ptType="node node" st="1 1" cnt="1 0" func="cnt" op="equ" val="1">
-            <dgm:constrLst>
-              <dgm:constr type="diam" val="170"/>
-              <dgm:constr type="w" for="ch" forName="centerShape" refType="w"/>
-              <dgm:constr type="w" for="ch" forName="oneComp" refType="w" refFor="ch" refForName="centerShape" op="equ" fact="0.7"/>
-              <dgm:constr type="sp" refType="w" refFor="ch" refForName="oneComp" fact="0.3"/>
-              <dgm:constr type="sibSp" refType="w" refFor="ch" refForName="oneComp" fact="0.3"/>
-              <dgm:constr type="primFontSz" for="ch" forName="centerShape" val="65"/>
-              <dgm:constr type="primFontSz" for="des" forName="oneNode" refType="primFontSz" refFor="ch" refForName="centerShape" fact="0.95"/>
-              <dgm:constr type="primFontSz" for="des" forName="oneNode" refType="primFontSz" refFor="ch" refForName="centerShape" op="lte" fact="0.95"/>
-              <dgm:constr type="diam" for="ch" forName="singleconn" refType="diam" op="equ" fact="-1"/>
-              <dgm:constr type="h" for="ch" forName="singleconn" refType="w" refFor="ch" refForName="oneComp" fact="0.24"/>
-              <dgm:constr type="w" for="ch" forName="dummya" refType="w" refFor="ch" refForName="oneComp" op="equ"/>
-              <dgm:constr type="w" for="ch" forName="dummyb" refType="w" refFor="ch" refForName="oneComp" op="equ"/>
-              <dgm:constr type="w" for="ch" forName="dummyc" refType="w" refFor="ch" refForName="oneComp" op="equ"/>
-            </dgm:constrLst>
-          </dgm:if>
-          <dgm:else name="Name14">
-            <dgm:constrLst>
-              <dgm:constr type="diam" val="170"/>
-              <dgm:constr type="w" for="ch" forName="centerShape" refType="w"/>
-              <dgm:constr type="w" for="ch" forName="node" refType="w" refFor="ch" refForName="centerShape" op="equ" fact="0.7"/>
-              <dgm:constr type="sp" refType="w" refFor="ch" refForName="node" fact="0.3"/>
-              <dgm:constr type="sibSp" refType="w" refFor="ch" refForName="node" fact="0.3"/>
-              <dgm:constr type="primFontSz" for="ch" forName="centerShape" val="65"/>
-              <dgm:constr type="primFontSz" for="des" forName="node" refType="primFontSz" refFor="ch" refForName="centerShape" fact="0.78"/>
-              <dgm:constr type="primFontSz" for="ch" forName="node" refType="primFontSz" refFor="ch" refForName="centerShape" op="lte" fact="0.95"/>
-              <dgm:constr type="diam" for="ch" forName="sibTrans" refType="diam" op="equ"/>
-              <dgm:constr type="h" for="ch" forName="sibTrans" refType="w" refFor="ch" refForName="node" fact="0.24"/>
-              <dgm:constr type="w" for="ch" forName="dummy" val="1"/>
-            </dgm:constrLst>
-          </dgm:else>
-        </dgm:choose>
-      </dgm:if>
-      <dgm:else name="Name15">
-        <dgm:choose name="Name16">
-          <dgm:if name="Name17" axis="ch ch" ptType="node node" st="1 1" cnt="1 0" func="cnt" op="equ" val="1">
-            <dgm:constrLst>
-              <dgm:constr type="diam" val="170"/>
-              <dgm:constr type="w" for="ch" forName="centerShape" refType="w"/>
-              <dgm:constr type="w" for="ch" forName="oneComp" refType="w" refFor="ch" refForName="centerShape" op="equ" fact="0.7"/>
-              <dgm:constr type="sp" refType="w" refFor="ch" refForName="oneComp" fact="0.3"/>
-              <dgm:constr type="sibSp" refType="w" refFor="ch" refForName="oneComp" fact="0.3"/>
-              <dgm:constr type="primFontSz" for="ch" forName="centerShape" val="65"/>
-              <dgm:constr type="primFontSz" for="des" forName="oneNode" refType="primFontSz" refFor="ch" refForName="centerShape" fact="0.95"/>
-              <dgm:constr type="primFontSz" for="ch" forName="oneNode" refType="primFontSz" refFor="ch" refForName="centerShape" op="lte" fact="0.95"/>
-              <dgm:constr type="diam" for="ch" forName="singleconn" refType="diam"/>
-              <dgm:constr type="h" for="ch" forName="singleconn" refType="w" refFor="ch" refForName="oneComp" fact="0.24"/>
-              <dgm:constr type="diam" for="ch" refType="diam" op="equ"/>
-              <dgm:constr type="w" for="ch" forName="dummya" refType="w" refFor="ch" refForName="oneComp" op="equ"/>
-              <dgm:constr type="w" for="ch" forName="dummyb" refType="w" refFor="ch" refForName="oneComp" op="equ"/>
-              <dgm:constr type="w" for="ch" forName="dummyc" refType="w" refFor="ch" refForName="oneComp" op="equ"/>
-            </dgm:constrLst>
-          </dgm:if>
-          <dgm:else name="Name18">
-            <dgm:constrLst>
-              <dgm:constr type="diam" val="170"/>
-              <dgm:constr type="w" for="ch" forName="centerShape" refType="w"/>
-              <dgm:constr type="w" for="ch" forName="node" refType="w" refFor="ch" refForName="centerShape" op="equ" fact="0.7"/>
-              <dgm:constr type="sp" refType="w" refFor="ch" refForName="node" fact="0.3"/>
-              <dgm:constr type="sibSp" refType="w" refFor="ch" refForName="node" fact="0.3"/>
-              <dgm:constr type="primFontSz" for="ch" forName="centerShape" val="65"/>
-              <dgm:constr type="primFontSz" for="des" forName="node" refType="primFontSz" refFor="ch" refForName="centerShape" fact="0.78"/>
-              <dgm:constr type="primFontSz" for="ch" forName="node" refType="primFontSz" refFor="ch" refForName="centerShape" op="lte" fact="0.95"/>
-              <dgm:constr type="diam" for="ch" ptType="sibTrans" refType="diam" fact="-1"/>
-              <dgm:constr type="h" for="ch" forName="sibTrans" refType="w" refFor="ch" refForName="node" fact="0.24"/>
-              <dgm:constr type="diam" for="ch" refType="diam" op="equ" fact="-1"/>
-              <dgm:constr type="w" for="ch" forName="dummy" val="1"/>
-            </dgm:constrLst>
-          </dgm:else>
-        </dgm:choose>
-      </dgm:else>
-    </dgm:choose>
-    <dgm:ruleLst>
-      <dgm:rule type="diam" val="INF" fact="NaN" max="NaN"/>
-    </dgm:ruleLst>
-    <dgm:forEach name="Name19" axis="ch" ptType="node" cnt="1">
-      <dgm:layoutNode name="centerShape" styleLbl="node0">
-        <dgm:alg type="tx"/>
-        <dgm:shape xmlns:r="http://schemas.openxmlformats.org/officeDocument/2006/relationships" type="ellipse" r:blip="">
-          <dgm:adjLst/>
-        </dgm:shape>
-        <dgm:presOf axis="self"/>
-        <dgm:constrLst>
-          <dgm:constr type="h" refType="w"/>
-          <dgm:constr type="tMarg" refType="primFontSz" fact="0.1"/>
-          <dgm:constr type="bMarg" refType="primFontSz" fact="0.1"/>
-          <dgm:constr type="lMarg" refType="primFontSz" fact="0.1"/>
-          <dgm:constr type="rMarg" refType="primFontSz" fact="0.1"/>
-        </dgm:constrLst>
-        <dgm:ruleLst>
-          <dgm:rule type="primFontSz" val="5" fact="NaN" max="NaN"/>
-        </dgm:ruleLst>
-      </dgm:layoutNode>
-      <dgm:forEach name="Name20" axis="ch">
-        <dgm:forEach name="Name21" axis="self" ptType="node">
-          <dgm:choose name="Name22">
-            <dgm:if name="Name23" axis="par ch" ptType="node node" func="cnt" op="gt" val="1">
-              <dgm:layoutNode name="node" styleLbl="node1">
-                <dgm:varLst>
-                  <dgm:bulletEnabled val="1"/>
-                </dgm:varLst>
-                <dgm:alg type="tx">
-                  <dgm:param type="txAnchorVertCh" val="mid"/>
-                </dgm:alg>
-                <dgm:shape xmlns:r="http://schemas.openxmlformats.org/officeDocument/2006/relationships" type="ellipse" r:blip="">
-                  <dgm:adjLst/>
-                </dgm:shape>
-                <dgm:presOf axis="desOrSelf" ptType="node"/>
-                <dgm:constrLst>
-                  <dgm:constr type="h" refType="w"/>
-                  <dgm:constr type="tMarg" refType="primFontSz" fact="0.1"/>
-                  <dgm:constr type="bMarg" refType="primFontSz" fact="0.1"/>
-                  <dgm:constr type="lMarg" refType="primFontSz" fact="0.1"/>
-                  <dgm:constr type="rMarg" refType="primFontSz" fact="0.1"/>
-                </dgm:constrLst>
-                <dgm:ruleLst>
-                  <dgm:rule type="primFontSz" val="5" fact="NaN" max="NaN"/>
-                </dgm:ruleLst>
-              </dgm:layoutNode>
-              <dgm:layoutNode name="dummy">
-                <dgm:alg type="sp"/>
-                <dgm:shape xmlns:r="http://schemas.openxmlformats.org/officeDocument/2006/relationships" r:blip="">
-                  <dgm:adjLst/>
-                </dgm:shape>
-                <dgm:presOf/>
-                <dgm:constrLst>
-                  <dgm:constr type="h" refType="w"/>
-                </dgm:constrLst>
-                <dgm:ruleLst/>
-              </dgm:layoutNode>
-              <dgm:forEach name="sibTransForEach" axis="followSib" ptType="sibTrans" hideLastTrans="0" cnt="1">
-                <dgm:layoutNode name="sibTrans" styleLbl="sibTrans2D1">
-                  <dgm:alg type="conn">
-                    <dgm:param type="connRout" val="curve"/>
-                    <dgm:param type="begPts" val="ctr"/>
-                    <dgm:param type="endPts" val="ctr"/>
-                    <dgm:param type="begSty" val="noArr"/>
-                    <dgm:param type="endSty" val="noArr"/>
-                    <dgm:param type="dstNode" val="node"/>
-                  </dgm:alg>
-                  <dgm:shape xmlns:r="http://schemas.openxmlformats.org/officeDocument/2006/relationships" type="conn" r:blip="" zOrderOff="-999">
-                    <dgm:adjLst/>
-                  </dgm:shape>
-                  <dgm:presOf axis="self"/>
-                  <dgm:constrLst>
-                    <dgm:constr type="begPad"/>
-                    <dgm:constr type="endPad"/>
-                  </dgm:constrLst>
-                  <dgm:ruleLst/>
-                </dgm:layoutNode>
-              </dgm:forEach>
-            </dgm:if>
-            <dgm:if name="Name24" axis="par ch" ptType="node node" func="cnt" op="equ" val="1">
-              <dgm:layoutNode name="oneComp">
-                <dgm:alg type="composite">
-                  <dgm:param type="ar" val="1"/>
-                </dgm:alg>
-                <dgm:shape xmlns:r="http://schemas.openxmlformats.org/officeDocument/2006/relationships" r:blip="">
-                  <dgm:adjLst/>
-                </dgm:shape>
-                <dgm:presOf/>
-                <dgm:constrLst>
-                  <dgm:constr type="h" refType="w"/>
-                  <dgm:constr type="l" for="ch" forName="dummyConnPt" refType="w" fact="0.5"/>
-                  <dgm:constr type="t" for="ch" forName="dummyConnPt" refType="w" fact="0.5"/>
-                  <dgm:constr type="l" for="ch" forName="oneNode"/>
-                  <dgm:constr type="t" for="ch" forName="oneNode"/>
-                  <dgm:constr type="h" for="ch" forName="oneNode" refType="h"/>
-                  <dgm:constr type="w" for="ch" forName="oneNode" refType="w"/>
-                </dgm:constrLst>
-                <dgm:ruleLst/>
-                <dgm:layoutNode name="dummyConnPt" styleLbl="node1">
-                  <dgm:alg type="sp"/>
-                  <dgm:shape xmlns:r="http://schemas.openxmlformats.org/officeDocument/2006/relationships" r:blip="">
-                    <dgm:adjLst/>
-                  </dgm:shape>
-                  <dgm:presOf/>
-                  <dgm:constrLst>
-                    <dgm:constr type="w" val="1"/>
-                    <dgm:constr type="h" val="1"/>
-                  </dgm:constrLst>
-                  <dgm:ruleLst/>
-                </dgm:layoutNode>
-                <dgm:layoutNode name="oneNode" styleLbl="node1">
-                  <dgm:varLst>
-                    <dgm:bulletEnabled val="1"/>
-                  </dgm:varLst>
-                  <dgm:alg type="tx">
-                    <dgm:param type="txAnchorVertCh" val="mid"/>
-                  </dgm:alg>
-                  <dgm:shape xmlns:r="http://schemas.openxmlformats.org/officeDocument/2006/relationships" type="ellipse" r:blip="">
-                    <dgm:adjLst/>
-                  </dgm:shape>
-                  <dgm:presOf axis="desOrSelf" ptType="node"/>
-                  <dgm:constrLst>
-                    <dgm:constr type="h" refType="w"/>
-                    <dgm:constr type="tMarg" refType="primFontSz" fact="0.1"/>
-                    <dgm:constr type="bMarg" refType="primFontSz" fact="0.1"/>
-                    <dgm:constr type="lMarg" refType="primFontSz" fact="0.1"/>
-                    <dgm:constr type="rMarg" refType="primFontSz" fact="0.1"/>
-                  </dgm:constrLst>
-                  <dgm:ruleLst>
-                    <dgm:rule type="primFontSz" val="5" fact="NaN" max="NaN"/>
-                  </dgm:ruleLst>
-                </dgm:layoutNode>
-              </dgm:layoutNode>
-              <dgm:layoutNode name="dummya">
-                <dgm:alg type="sp"/>
-                <dgm:shape xmlns:r="http://schemas.openxmlformats.org/officeDocument/2006/relationships" r:blip="">
-                  <dgm:adjLst/>
-                </dgm:shape>
-                <dgm:presOf/>
-                <dgm:constrLst>
-                  <dgm:constr type="h" refType="w"/>
-                </dgm:constrLst>
-                <dgm:ruleLst/>
-              </dgm:layoutNode>
-              <dgm:layoutNode name="dummyb">
-                <dgm:alg type="sp"/>
-                <dgm:shape xmlns:r="http://schemas.openxmlformats.org/officeDocument/2006/relationships" r:blip="">
-                  <dgm:adjLst/>
-                </dgm:shape>
-                <dgm:presOf/>
-                <dgm:constrLst>
-                  <dgm:constr type="h" refType="w"/>
-                </dgm:constrLst>
-                <dgm:ruleLst/>
-              </dgm:layoutNode>
-              <dgm:layoutNode name="dummyc">
-                <dgm:alg type="sp"/>
-                <dgm:shape xmlns:r="http://schemas.openxmlformats.org/officeDocument/2006/relationships" r:blip="">
-                  <dgm:adjLst/>
-                </dgm:shape>
-                <dgm:presOf/>
-                <dgm:constrLst>
-                  <dgm:constr type="h" refType="w"/>
-                </dgm:constrLst>
-                <dgm:ruleLst/>
-              </dgm:layoutNode>
-              <dgm:forEach name="sibTransForEach1" axis="followSib" ptType="sibTrans" hideLastTrans="0" cnt="1">
-                <dgm:layoutNode name="singleconn" styleLbl="sibTrans2D1">
-                  <dgm:alg type="conn">
-                    <dgm:param type="connRout" val="longCurve"/>
-                    <dgm:param type="begPts" val="bCtr"/>
-                    <dgm:param type="endPts" val="tCtr"/>
-                    <dgm:param type="begSty" val="noArr"/>
-                    <dgm:param type="endSty" val="noArr"/>
-                    <dgm:param type="srcNode" val="dummyConnPt"/>
-                    <dgm:param type="dstNode" val="dummyConnPt"/>
-                  </dgm:alg>
-                  <dgm:shape xmlns:r="http://schemas.openxmlformats.org/officeDocument/2006/relationships" type="conn" r:blip="" zOrderOff="-999">
-                    <dgm:adjLst/>
-                  </dgm:shape>
-                  <dgm:presOf axis="self"/>
-                  <dgm:constrLst>
-                    <dgm:constr type="begPad"/>
-                    <dgm:constr type="endPad"/>
-                  </dgm:constrLst>
-                  <dgm:ruleLst/>
-                </dgm:layoutNode>
-              </dgm:forEach>
-            </dgm:if>
-            <dgm:else name="Name25"/>
-          </dgm:choose>
-        </dgm:forEach>
-      </dgm:forEach>
-    </dgm:forEach>
-  </dgm:layoutNode>
-</dgm:layoutDef>
-</file>
-
-<file path=ppt/diagrams/quickStyle1.xml><?xml version="1.0" encoding="utf-8"?>
-<dgm:styleDef xmlns:dgm="http://schemas.openxmlformats.org/drawingml/2006/diagram" xmlns:a="http://schemas.openxmlformats.org/drawingml/2006/main" uniqueId="urn:microsoft.com/office/officeart/2005/8/quickstyle/simple1">
-  <dgm:title val=""/>
-  <dgm:desc val=""/>
-  <dgm:catLst>
-    <dgm:cat type="simple" pri="10100"/>
-  </dgm:catLst>
-  <dgm:scene3d>
-    <a:camera prst="orthographicFront"/>
-    <a:lightRig rig="threePt" dir="t"/>
-  </dgm:scene3d>
-  <dgm:styleLbl name="node0">
-    <dgm:scene3d>
-      <a:camera prst="orthographicFront"/>
-      <a:lightRig rig="threePt" dir="t"/>
-    </dgm:scene3d>
-    <dgm:sp3d/>
-    <dgm:txPr/>
-    <dgm:style>
-      <a:lnRef idx="2">
-        <a:scrgbClr r="0" g="0" b="0"/>
-      </a:lnRef>
-      <a:fillRef idx="1">
-        <a:scrgbClr r="0" g="0" b="0"/>
-      </a:fillRef>
-      <a:effectRef idx="0">
-        <a:scrgbClr r="0" g="0" b="0"/>
-      </a:effectRef>
-      <a:fontRef idx="minor">
-        <a:schemeClr val="lt1"/>
-      </a:fontRef>
-    </dgm:style>
-  </dgm:styleLbl>
-  <dgm:styleLbl name="lnNode1">
-    <dgm:scene3d>
-      <a:camera prst="orthographicFront"/>
-      <a:lightRig rig="threePt" dir="t"/>
-    </dgm:scene3d>
-    <dgm:sp3d/>
-    <dgm:txPr/>
-    <dgm:style>
-      <a:lnRef idx="2">
-        <a:scrgbClr r="0" g="0" b="0"/>
-      </a:lnRef>
-      <a:fillRef idx="1">
-        <a:scrgbClr r="0" g="0" b="0"/>
-      </a:fillRef>
-      <a:effectRef idx="0">
-        <a:scrgbClr r="0" g="0" b="0"/>
-      </a:effectRef>
-      <a:fontRef idx="minor">
-        <a:schemeClr val="lt1"/>
-      </a:fontRef>
-    </dgm:style>
-  </dgm:styleLbl>
-  <dgm:styleLbl name="vennNode1">
-    <dgm:scene3d>
-      <a:camera prst="orthographicFront"/>
-      <a:lightRig rig="threePt" dir="t"/>
-    </dgm:scene3d>
-    <dgm:sp3d/>
-    <dgm:txPr/>
-    <dgm:style>
-      <a:lnRef idx="2">
-        <a:scrgbClr r="0" g="0" b="0"/>
-      </a:lnRef>
-      <a:fillRef idx="1">
-        <a:scrgbClr r="0" g="0" b="0"/>
-      </a:fillRef>
-      <a:effectRef idx="0">
-        <a:scrgbClr r="0" g="0" b="0"/>
-      </a:effectRef>
-      <a:fontRef idx="minor">
-        <a:schemeClr val="tx1"/>
-      </a:fontRef>
-    </dgm:style>
-  </dgm:styleLbl>
-  <dgm:styleLbl name="alignNode1">
-    <dgm:scene3d>
-      <a:camera prst="orthographicFront"/>
-      <a:lightRig rig="threePt" dir="t"/>
-    </dgm:scene3d>
-    <dgm:sp3d/>
-    <dgm:txPr/>
-    <dgm:style>
-      <a:lnRef idx="2">
-        <a:scrgbClr r="0" g="0" b="0"/>
-      </a:lnRef>
-      <a:fillRef idx="1">
-        <a:scrgbClr r="0" g="0" b="0"/>
-      </a:fillRef>
-      <a:effectRef idx="0">
-        <a:scrgbClr r="0" g="0" b="0"/>
-      </a:effectRef>
-      <a:fontRef idx="minor">
-        <a:schemeClr val="lt1"/>
-      </a:fontRef>
-    </dgm:style>
-  </dgm:styleLbl>
-  <dgm:styleLbl name="node1">
-    <dgm:scene3d>
-      <a:camera prst="orthographicFront"/>
-      <a:lightRig rig="threePt" dir="t"/>
-    </dgm:scene3d>
-    <dgm:sp3d/>
-    <dgm:txPr/>
-    <dgm:style>
-      <a:lnRef idx="2">
-        <a:scrgbClr r="0" g="0" b="0"/>
-      </a:lnRef>
-      <a:fillRef idx="1">
-        <a:scrgbClr r="0" g="0" b="0"/>
-      </a:fillRef>
-      <a:effectRef idx="0">
-        <a:scrgbClr r="0" g="0" b="0"/>
-      </a:effectRef>
-      <a:fontRef idx="minor">
-        <a:schemeClr val="lt1"/>
-      </a:fontRef>
-    </dgm:style>
-  </dgm:styleLbl>
-  <dgm:styleLbl name="node2">
-    <dgm:scene3d>
-      <a:camera prst="orthographicFront"/>
-      <a:lightRig rig="threePt" dir="t"/>
-    </dgm:scene3d>
-    <dgm:sp3d/>
-    <dgm:txPr/>
-    <dgm:style>
-      <a:lnRef idx="2">
-        <a:scrgbClr r="0" g="0" b="0"/>
-      </a:lnRef>
-      <a:fillRef idx="1">
-        <a:scrgbClr r="0" g="0" b="0"/>
-      </a:fillRef>
-      <a:effectRef idx="0">
-        <a:scrgbClr r="0" g="0" b="0"/>
-      </a:effectRef>
-      <a:fontRef idx="minor">
-        <a:schemeClr val="lt1"/>
-      </a:fontRef>
-    </dgm:style>
-  </dgm:styleLbl>
-  <dgm:styleLbl name="node3">
-    <dgm:scene3d>
-      <a:camera prst="orthographicFront"/>
-      <a:lightRig rig="threePt" dir="t"/>
-    </dgm:scene3d>
-    <dgm:sp3d/>
-    <dgm:txPr/>
-    <dgm:style>
-      <a:lnRef idx="2">
-        <a:scrgbClr r="0" g="0" b="0"/>
-      </a:lnRef>
-      <a:fillRef idx="1">
-        <a:scrgbClr r="0" g="0" b="0"/>
-      </a:fillRef>
-      <a:effectRef idx="0">
-        <a:scrgbClr r="0" g="0" b="0"/>
-      </a:effectRef>
-      <a:fontRef idx="minor">
-        <a:schemeClr val="lt1"/>
-      </a:fontRef>
-    </dgm:style>
-  </dgm:styleLbl>
-  <dgm:styleLbl name="node4">
-    <dgm:scene3d>
-      <a:camera prst="orthographicFront"/>
-      <a:lightRig rig="threePt" dir="t"/>
-    </dgm:scene3d>
-    <dgm:sp3d/>
-    <dgm:txPr/>
-    <dgm:style>
-      <a:lnRef idx="2">
-        <a:scrgbClr r="0" g="0" b="0"/>
-      </a:lnRef>
-      <a:fillRef idx="1">
-        <a:scrgbClr r="0" g="0" b="0"/>
-      </a:fillRef>
-      <a:effectRef idx="0">
-        <a:scrgbClr r="0" g="0" b="0"/>
-      </a:effectRef>
-      <a:fontRef idx="minor">
-        <a:schemeClr val="lt1"/>
-      </a:fontRef>
-    </dgm:style>
-  </dgm:styleLbl>
-  <dgm:styleLbl name="fgImgPlace1">
-    <dgm:scene3d>
-      <a:camera prst="orthographicFront"/>
-      <a:lightRig rig="threePt" dir="t"/>
-    </dgm:scene3d>
-    <dgm:sp3d/>
-    <dgm:txPr/>
-    <dgm:style>
-      <a:lnRef idx="2">
-        <a:scrgbClr r="0" g="0" b="0"/>
-      </a:lnRef>
-      <a:fillRef idx="1">
-        <a:scrgbClr r="0" g="0" b="0"/>
-      </a:fillRef>
-      <a:effectRef idx="0">
-        <a:scrgbClr r="0" g="0" b="0"/>
-      </a:effectRef>
-      <a:fontRef idx="minor"/>
-    </dgm:style>
-  </dgm:styleLbl>
-  <dgm:styleLbl name="alignImgPlace1">
-    <dgm:scene3d>
-      <a:camera prst="orthographicFront"/>
-      <a:lightRig rig="threePt" dir="t"/>
-    </dgm:scene3d>
-    <dgm:sp3d/>
-    <dgm:txPr/>
-    <dgm:style>
-      <a:lnRef idx="2">
-        <a:scrgbClr r="0" g="0" b="0"/>
-      </a:lnRef>
-      <a:fillRef idx="1">
-        <a:scrgbClr r="0" g="0" b="0"/>
-      </a:fillRef>
-      <a:effectRef idx="0">
-        <a:scrgbClr r="0" g="0" b="0"/>
-      </a:effectRef>
-      <a:fontRef idx="minor"/>
-    </dgm:style>
-  </dgm:styleLbl>
-  <dgm:styleLbl name="bgImgPlace1">
-    <dgm:scene3d>
-      <a:camera prst="orthographicFront"/>
-      <a:lightRig rig="threePt" dir="t"/>
-    </dgm:scene3d>
-    <dgm:sp3d/>
-    <dgm:txPr/>
-    <dgm:style>
-      <a:lnRef idx="2">
-        <a:scrgbClr r="0" g="0" b="0"/>
-      </a:lnRef>
-      <a:fillRef idx="1">
-        <a:scrgbClr r="0" g="0" b="0"/>
-      </a:fillRef>
-      <a:effectRef idx="0">
-        <a:scrgbClr r="0" g="0" b="0"/>
-      </a:effectRef>
-      <a:fontRef idx="minor"/>
-    </dgm:style>
-  </dgm:styleLbl>
-  <dgm:styleLbl name="sibTrans2D1">
-    <dgm:scene3d>
-      <a:camera prst="orthographicFront"/>
-      <a:lightRig rig="threePt" dir="t"/>
-    </dgm:scene3d>
-    <dgm:sp3d/>
-    <dgm:txPr/>
-    <dgm:style>
-      <a:lnRef idx="0">
-        <a:scrgbClr r="0" g="0" b="0"/>
-      </a:lnRef>
-      <a:fillRef idx="1">
-        <a:scrgbClr r="0" g="0" b="0"/>
-      </a:fillRef>
-      <a:effectRef idx="0">
-        <a:scrgbClr r="0" g="0" b="0"/>
-      </a:effectRef>
-      <a:fontRef idx="minor">
-        <a:schemeClr val="lt1"/>
-      </a:fontRef>
-    </dgm:style>
-  </dgm:styleLbl>
-  <dgm:styleLbl name="fgSibTrans2D1">
-    <dgm:scene3d>
-      <a:camera prst="orthographicFront"/>
-      <a:lightRig rig="threePt" dir="t"/>
-    </dgm:scene3d>
-    <dgm:sp3d/>
-    <dgm:txPr/>
-    <dgm:style>
-      <a:lnRef idx="0">
-        <a:scrgbClr r="0" g="0" b="0"/>
-      </a:lnRef>
-      <a:fillRef idx="1">
-        <a:scrgbClr r="0" g="0" b="0"/>
-      </a:fillRef>
-      <a:effectRef idx="0">
-        <a:scrgbClr r="0" g="0" b="0"/>
-      </a:effectRef>
-      <a:fontRef idx="minor">
-        <a:schemeClr val="lt1"/>
-      </a:fontRef>
-    </dgm:style>
-  </dgm:styleLbl>
-  <dgm:styleLbl name="bgSibTrans2D1">
-    <dgm:scene3d>
-      <a:camera prst="orthographicFront"/>
-      <a:lightRig rig="threePt" dir="t"/>
-    </dgm:scene3d>
-    <dgm:sp3d/>
-    <dgm:txPr/>
-    <dgm:style>
-      <a:lnRef idx="0">
-        <a:scrgbClr r="0" g="0" b="0"/>
-      </a:lnRef>
-      <a:fillRef idx="1">
-        <a:scrgbClr r="0" g="0" b="0"/>
-      </a:fillRef>
-      <a:effectRef idx="0">
-        <a:scrgbClr r="0" g="0" b="0"/>
-      </a:effectRef>
-      <a:fontRef idx="minor">
-        <a:schemeClr val="lt1"/>
-      </a:fontRef>
-    </dgm:style>
-  </dgm:styleLbl>
-  <dgm:styleLbl name="sibTrans1D1">
-    <dgm:scene3d>
-      <a:camera prst="orthographicFront"/>
-      <a:lightRig rig="threePt" dir="t"/>
-    </dgm:scene3d>
-    <dgm:sp3d/>
-    <dgm:txPr/>
-    <dgm:style>
-      <a:lnRef idx="1">
-        <a:scrgbClr r="0" g="0" b="0"/>
-      </a:lnRef>
-      <a:fillRef idx="0">
-        <a:scrgbClr r="0" g="0" b="0"/>
-      </a:fillRef>
-      <a:effectRef idx="0">
-        <a:scrgbClr r="0" g="0" b="0"/>
-      </a:effectRef>
-      <a:fontRef idx="minor"/>
-    </dgm:style>
-  </dgm:styleLbl>
-  <dgm:styleLbl name="callout">
-    <dgm:scene3d>
-      <a:camera prst="orthographicFront"/>
-      <a:lightRig rig="threePt" dir="t"/>
-    </dgm:scene3d>
-    <dgm:sp3d/>
-    <dgm:txPr/>
-    <dgm:style>
-      <a:lnRef idx="2">
-        <a:scrgbClr r="0" g="0" b="0"/>
-      </a:lnRef>
-      <a:fillRef idx="1">
-        <a:scrgbClr r="0" g="0" b="0"/>
-      </a:fillRef>
-      <a:effectRef idx="0">
-        <a:scrgbClr r="0" g="0" b="0"/>
-      </a:effectRef>
-      <a:fontRef idx="minor"/>
-    </dgm:style>
-  </dgm:styleLbl>
-  <dgm:styleLbl name="asst0">
-    <dgm:scene3d>
-      <a:camera prst="orthographicFront"/>
-      <a:lightRig rig="threePt" dir="t"/>
-    </dgm:scene3d>
-    <dgm:sp3d/>
-    <dgm:txPr/>
-    <dgm:style>
-      <a:lnRef idx="2">
-        <a:scrgbClr r="0" g="0" b="0"/>
-      </a:lnRef>
-      <a:fillRef idx="1">
-        <a:scrgbClr r="0" g="0" b="0"/>
-      </a:fillRef>
-      <a:effectRef idx="0">
-        <a:scrgbClr r="0" g="0" b="0"/>
-      </a:effectRef>
-      <a:fontRef idx="minor">
-        <a:schemeClr val="lt1"/>
-      </a:fontRef>
-    </dgm:style>
-  </dgm:styleLbl>
-  <dgm:styleLbl name="asst1">
-    <dgm:scene3d>
-      <a:camera prst="orthographicFront"/>
-      <a:lightRig rig="threePt" dir="t"/>
-    </dgm:scene3d>
-    <dgm:sp3d/>
-    <dgm:txPr/>
-    <dgm:style>
-      <a:lnRef idx="2">
-        <a:scrgbClr r="0" g="0" b="0"/>
-      </a:lnRef>
-      <a:fillRef idx="1">
-        <a:scrgbClr r="0" g="0" b="0"/>
-      </a:fillRef>
-      <a:effectRef idx="0">
-        <a:scrgbClr r="0" g="0" b="0"/>
-      </a:effectRef>
-      <a:fontRef idx="minor">
-        <a:schemeClr val="lt1"/>
-      </a:fontRef>
-    </dgm:style>
-  </dgm:styleLbl>
-  <dgm:styleLbl name="asst2">
-    <dgm:scene3d>
-      <a:camera prst="orthographicFront"/>
-      <a:lightRig rig="threePt" dir="t"/>
-    </dgm:scene3d>
-    <dgm:sp3d/>
-    <dgm:txPr/>
-    <dgm:style>
-      <a:lnRef idx="2">
-        <a:scrgbClr r="0" g="0" b="0"/>
-      </a:lnRef>
-      <a:fillRef idx="1">
-        <a:scrgbClr r="0" g="0" b="0"/>
-      </a:fillRef>
-      <a:effectRef idx="0">
-        <a:scrgbClr r="0" g="0" b="0"/>
-      </a:effectRef>
-      <a:fontRef idx="minor">
-        <a:schemeClr val="lt1"/>
-      </a:fontRef>
-    </dgm:style>
-  </dgm:styleLbl>
-  <dgm:styleLbl name="asst3">
-    <dgm:scene3d>
-      <a:camera prst="orthographicFront"/>
-      <a:lightRig rig="threePt" dir="t"/>
-    </dgm:scene3d>
-    <dgm:sp3d/>
-    <dgm:txPr/>
-    <dgm:style>
-      <a:lnRef idx="2">
-        <a:scrgbClr r="0" g="0" b="0"/>
-      </a:lnRef>
-      <a:fillRef idx="1">
-        <a:scrgbClr r="0" g="0" b="0"/>
-      </a:fillRef>
-      <a:effectRef idx="0">
-        <a:scrgbClr r="0" g="0" b="0"/>
-      </a:effectRef>
-      <a:fontRef idx="minor">
-        <a:schemeClr val="lt1"/>
-      </a:fontRef>
-    </dgm:style>
-  </dgm:styleLbl>
-  <dgm:styleLbl name="asst4">
-    <dgm:scene3d>
-      <a:camera prst="orthographicFront"/>
-      <a:lightRig rig="threePt" dir="t"/>
-    </dgm:scene3d>
-    <dgm:sp3d/>
-    <dgm:txPr/>
-    <dgm:style>
-      <a:lnRef idx="2">
-        <a:scrgbClr r="0" g="0" b="0"/>
-      </a:lnRef>
-      <a:fillRef idx="1">
-        <a:scrgbClr r="0" g="0" b="0"/>
-      </a:fillRef>
-      <a:effectRef idx="0">
-        <a:scrgbClr r="0" g="0" b="0"/>
-      </a:effectRef>
-      <a:fontRef idx="minor">
-        <a:schemeClr val="lt1"/>
-      </a:fontRef>
-    </dgm:style>
-  </dgm:styleLbl>
-  <dgm:styleLbl name="parChTrans2D1">
-    <dgm:scene3d>
-      <a:camera prst="orthographicFront"/>
-      <a:lightRig rig="threePt" dir="t"/>
-    </dgm:scene3d>
-    <dgm:sp3d/>
-    <dgm:txPr/>
-    <dgm:style>
-      <a:lnRef idx="2">
-        <a:scrgbClr r="0" g="0" b="0"/>
-      </a:lnRef>
-      <a:fillRef idx="1">
-        <a:scrgbClr r="0" g="0" b="0"/>
-      </a:fillRef>
-      <a:effectRef idx="0">
-        <a:scrgbClr r="0" g="0" b="0"/>
-      </a:effectRef>
-      <a:fontRef idx="minor">
-        <a:schemeClr val="lt1"/>
-      </a:fontRef>
-    </dgm:style>
-  </dgm:styleLbl>
-  <dgm:styleLbl name="parChTrans2D2">
-    <dgm:scene3d>
-      <a:camera prst="orthographicFront"/>
-      <a:lightRig rig="threePt" dir="t"/>
-    </dgm:scene3d>
-    <dgm:sp3d/>
-    <dgm:txPr/>
-    <dgm:style>
-      <a:lnRef idx="2">
-        <a:scrgbClr r="0" g="0" b="0"/>
-      </a:lnRef>
-      <a:fillRef idx="1">
-        <a:scrgbClr r="0" g="0" b="0"/>
-      </a:fillRef>
-      <a:effectRef idx="0">
-        <a:scrgbClr r="0" g="0" b="0"/>
-      </a:effectRef>
-      <a:fontRef idx="minor">
-        <a:schemeClr val="lt1"/>
-      </a:fontRef>
-    </dgm:style>
-  </dgm:styleLbl>
-  <dgm:styleLbl name="parChTrans2D3">
-    <dgm:scene3d>
-      <a:camera prst="orthographicFront"/>
-      <a:lightRig rig="threePt" dir="t"/>
-    </dgm:scene3d>
-    <dgm:sp3d/>
-    <dgm:txPr/>
-    <dgm:style>
-      <a:lnRef idx="2">
-        <a:scrgbClr r="0" g="0" b="0"/>
-      </a:lnRef>
-      <a:fillRef idx="1">
-        <a:scrgbClr r="0" g="0" b="0"/>
-      </a:fillRef>
-      <a:effectRef idx="0">
-        <a:scrgbClr r="0" g="0" b="0"/>
-      </a:effectRef>
-      <a:fontRef idx="minor">
-        <a:schemeClr val="lt1"/>
-      </a:fontRef>
-    </dgm:style>
-  </dgm:styleLbl>
-  <dgm:styleLbl name="parChTrans2D4">
-    <dgm:scene3d>
-      <a:camera prst="orthographicFront"/>
-      <a:lightRig rig="threePt" dir="t"/>
-    </dgm:scene3d>
-    <dgm:sp3d/>
-    <dgm:txPr/>
-    <dgm:style>
-      <a:lnRef idx="2">
-        <a:scrgbClr r="0" g="0" b="0"/>
-      </a:lnRef>
-      <a:fillRef idx="1">
-        <a:scrgbClr r="0" g="0" b="0"/>
-      </a:fillRef>
-      <a:effectRef idx="0">
-        <a:scrgbClr r="0" g="0" b="0"/>
-      </a:effectRef>
-      <a:fontRef idx="minor">
-        <a:schemeClr val="lt1"/>
-      </a:fontRef>
-    </dgm:style>
-  </dgm:styleLbl>
-  <dgm:styleLbl name="parChTrans1D1">
-    <dgm:scene3d>
-      <a:camera prst="orthographicFront"/>
-      <a:lightRig rig="threePt" dir="t"/>
-    </dgm:scene3d>
-    <dgm:sp3d/>
-    <dgm:txPr/>
-    <dgm:style>
-      <a:lnRef idx="2">
-        <a:scrgbClr r="0" g="0" b="0"/>
-      </a:lnRef>
-      <a:fillRef idx="0">
-        <a:scrgbClr r="0" g="0" b="0"/>
-      </a:fillRef>
-      <a:effectRef idx="0">
-        <a:scrgbClr r="0" g="0" b="0"/>
-      </a:effectRef>
-      <a:fontRef idx="minor"/>
-    </dgm:style>
-  </dgm:styleLbl>
-  <dgm:styleLbl name="parChTrans1D2">
-    <dgm:scene3d>
-      <a:camera prst="orthographicFront"/>
-      <a:lightRig rig="threePt" dir="t"/>
-    </dgm:scene3d>
-    <dgm:sp3d/>
-    <dgm:txPr/>
-    <dgm:style>
-      <a:lnRef idx="2">
-        <a:scrgbClr r="0" g="0" b="0"/>
-      </a:lnRef>
-      <a:fillRef idx="0">
-        <a:scrgbClr r="0" g="0" b="0"/>
-      </a:fillRef>
-      <a:effectRef idx="0">
-        <a:scrgbClr r="0" g="0" b="0"/>
-      </a:effectRef>
-      <a:fontRef idx="minor"/>
-    </dgm:style>
-  </dgm:styleLbl>
-  <dgm:styleLbl name="parChTrans1D3">
-    <dgm:scene3d>
-      <a:camera prst="orthographicFront"/>
-      <a:lightRig rig="threePt" dir="t"/>
-    </dgm:scene3d>
-    <dgm:sp3d/>
-    <dgm:txPr/>
-    <dgm:style>
-      <a:lnRef idx="2">
-        <a:scrgbClr r="0" g="0" b="0"/>
-      </a:lnRef>
-      <a:fillRef idx="0">
-        <a:scrgbClr r="0" g="0" b="0"/>
-      </a:fillRef>
-      <a:effectRef idx="0">
-        <a:scrgbClr r="0" g="0" b="0"/>
-      </a:effectRef>
-      <a:fontRef idx="minor"/>
-    </dgm:style>
-  </dgm:styleLbl>
-  <dgm:styleLbl name="parChTrans1D4">
-    <dgm:scene3d>
-      <a:camera prst="orthographicFront"/>
-      <a:lightRig rig="threePt" dir="t"/>
-    </dgm:scene3d>
-    <dgm:sp3d/>
-    <dgm:txPr/>
-    <dgm:style>
-      <a:lnRef idx="2">
-        <a:scrgbClr r="0" g="0" b="0"/>
-      </a:lnRef>
-      <a:fillRef idx="0">
-        <a:scrgbClr r="0" g="0" b="0"/>
-      </a:fillRef>
-      <a:effectRef idx="0">
-        <a:scrgbClr r="0" g="0" b="0"/>
-      </a:effectRef>
-      <a:fontRef idx="minor"/>
-    </dgm:style>
-  </dgm:styleLbl>
-  <dgm:styleLbl name="fgAcc1">
-    <dgm:scene3d>
-      <a:camera prst="orthographicFront"/>
-      <a:lightRig rig="threePt" dir="t"/>
-    </dgm:scene3d>
-    <dgm:sp3d/>
-    <dgm:txPr/>
-    <dgm:style>
-      <a:lnRef idx="2">
-        <a:scrgbClr r="0" g="0" b="0"/>
-      </a:lnRef>
-      <a:fillRef idx="1">
-        <a:scrgbClr r="0" g="0" b="0"/>
-      </a:fillRef>
-      <a:effectRef idx="0">
-        <a:scrgbClr r="0" g="0" b="0"/>
-      </a:effectRef>
-      <a:fontRef idx="minor"/>
-    </dgm:style>
-  </dgm:styleLbl>
-  <dgm:styleLbl name="conFgAcc1">
-    <dgm:scene3d>
-      <a:camera prst="orthographicFront"/>
-      <a:lightRig rig="threePt" dir="t"/>
-    </dgm:scene3d>
-    <dgm:sp3d/>
-    <dgm:txPr/>
-    <dgm:style>
-      <a:lnRef idx="2">
-        <a:scrgbClr r="0" g="0" b="0"/>
-      </a:lnRef>
-      <a:fillRef idx="1">
-        <a:scrgbClr r="0" g="0" b="0"/>
-      </a:fillRef>
-      <a:effectRef idx="0">
-        <a:scrgbClr r="0" g="0" b="0"/>
-      </a:effectRef>
-      <a:fontRef idx="minor"/>
-    </dgm:style>
-  </dgm:styleLbl>
-  <dgm:styleLbl name="alignAcc1">
-    <dgm:scene3d>
-      <a:camera prst="orthographicFront"/>
-      <a:lightRig rig="threePt" dir="t"/>
-    </dgm:scene3d>
-    <dgm:sp3d/>
-    <dgm:txPr/>
-    <dgm:style>
-      <a:lnRef idx="2">
-        <a:scrgbClr r="0" g="0" b="0"/>
-      </a:lnRef>
-      <a:fillRef idx="1">
-        <a:scrgbClr r="0" g="0" b="0"/>
-      </a:fillRef>
-      <a:effectRef idx="0">
-        <a:scrgbClr r="0" g="0" b="0"/>
-      </a:effectRef>
-      <a:fontRef idx="minor"/>
-    </dgm:style>
-  </dgm:styleLbl>
-  <dgm:styleLbl name="trAlignAcc1">
-    <dgm:scene3d>
-      <a:camera prst="orthographicFront"/>
-      <a:lightRig rig="threePt" dir="t"/>
-    </dgm:scene3d>
-    <dgm:sp3d/>
-    <dgm:txPr/>
-    <dgm:style>
-      <a:lnRef idx="1">
-        <a:scrgbClr r="0" g="0" b="0"/>
-      </a:lnRef>
-      <a:fillRef idx="1">
-        <a:scrgbClr r="0" g="0" b="0"/>
-      </a:fillRef>
-      <a:effectRef idx="0">
-        <a:scrgbClr r="0" g="0" b="0"/>
-      </a:effectRef>
-      <a:fontRef idx="minor"/>
-    </dgm:style>
-  </dgm:styleLbl>
-  <dgm:styleLbl name="bgAcc1">
-    <dgm:scene3d>
-      <a:camera prst="orthographicFront"/>
-      <a:lightRig rig="threePt" dir="t"/>
-    </dgm:scene3d>
-    <dgm:sp3d/>
-    <dgm:txPr/>
-    <dgm:style>
-      <a:lnRef idx="2">
-        <a:scrgbClr r="0" g="0" b="0"/>
-      </a:lnRef>
-      <a:fillRef idx="1">
-        <a:scrgbClr r="0" g="0" b="0"/>
-      </a:fillRef>
-      <a:effectRef idx="0">
-        <a:scrgbClr r="0" g="0" b="0"/>
-      </a:effectRef>
-      <a:fontRef idx="minor"/>
-    </dgm:style>
-  </dgm:styleLbl>
-  <dgm:styleLbl name="solidFgAcc1">
-    <dgm:scene3d>
-      <a:camera prst="orthographicFront"/>
-      <a:lightRig rig="threePt" dir="t"/>
-    </dgm:scene3d>
-    <dgm:sp3d/>
-    <dgm:txPr/>
-    <dgm:style>
-      <a:lnRef idx="2">
-        <a:scrgbClr r="0" g="0" b="0"/>
-      </a:lnRef>
-      <a:fillRef idx="1">
-        <a:scrgbClr r="0" g="0" b="0"/>
-      </a:fillRef>
-      <a:effectRef idx="0">
-        <a:scrgbClr r="0" g="0" b="0"/>
-      </a:effectRef>
-      <a:fontRef idx="minor"/>
-    </dgm:style>
-  </dgm:styleLbl>
-  <dgm:styleLbl name="solidAlignAcc1">
-    <dgm:scene3d>
-      <a:camera prst="orthographicFront"/>
-      <a:lightRig rig="threePt" dir="t"/>
-    </dgm:scene3d>
-    <dgm:sp3d/>
-    <dgm:txPr/>
-    <dgm:style>
-      <a:lnRef idx="2">
-        <a:scrgbClr r="0" g="0" b="0"/>
-      </a:lnRef>
-      <a:fillRef idx="1">
-        <a:scrgbClr r="0" g="0" b="0"/>
-      </a:fillRef>
-      <a:effectRef idx="0">
-        <a:scrgbClr r="0" g="0" b="0"/>
-      </a:effectRef>
-      <a:fontRef idx="minor"/>
-    </dgm:style>
-  </dgm:styleLbl>
-  <dgm:styleLbl name="solidBgAcc1">
-    <dgm:scene3d>
-      <a:camera prst="orthographicFront"/>
-      <a:lightRig rig="threePt" dir="t"/>
-    </dgm:scene3d>
-    <dgm:sp3d/>
-    <dgm:txPr/>
-    <dgm:style>
-      <a:lnRef idx="2">
-        <a:scrgbClr r="0" g="0" b="0"/>
-      </a:lnRef>
-      <a:fillRef idx="1">
-        <a:scrgbClr r="0" g="0" b="0"/>
-      </a:fillRef>
-      <a:effectRef idx="0">
-        <a:scrgbClr r="0" g="0" b="0"/>
-      </a:effectRef>
-      <a:fontRef idx="minor"/>
-    </dgm:style>
-  </dgm:styleLbl>
-  <dgm:styleLbl name="fgAccFollowNode1">
-    <dgm:scene3d>
-      <a:camera prst="orthographicFront"/>
-      <a:lightRig rig="threePt" dir="t"/>
-    </dgm:scene3d>
-    <dgm:sp3d/>
-    <dgm:txPr/>
-    <dgm:style>
-      <a:lnRef idx="2">
-        <a:scrgbClr r="0" g="0" b="0"/>
-      </a:lnRef>
-      <a:fillRef idx="1">
-        <a:scrgbClr r="0" g="0" b="0"/>
-      </a:fillRef>
-      <a:effectRef idx="0">
-        <a:scrgbClr r="0" g="0" b="0"/>
-      </a:effectRef>
-      <a:fontRef idx="minor"/>
-    </dgm:style>
-  </dgm:styleLbl>
-  <dgm:styleLbl name="alignAccFollowNode1">
-    <dgm:scene3d>
-      <a:camera prst="orthographicFront"/>
-      <a:lightRig rig="threePt" dir="t"/>
-    </dgm:scene3d>
-    <dgm:sp3d/>
-    <dgm:txPr/>
-    <dgm:style>
-      <a:lnRef idx="2">
-        <a:scrgbClr r="0" g="0" b="0"/>
-      </a:lnRef>
-      <a:fillRef idx="1">
-        <a:scrgbClr r="0" g="0" b="0"/>
-      </a:fillRef>
-      <a:effectRef idx="0">
-        <a:scrgbClr r="0" g="0" b="0"/>
-      </a:effectRef>
-      <a:fontRef idx="minor"/>
-    </dgm:style>
-  </dgm:styleLbl>
-  <dgm:styleLbl name="bgAccFollowNode1">
-    <dgm:scene3d>
-      <a:camera prst="orthographicFront"/>
-      <a:lightRig rig="threePt" dir="t"/>
-    </dgm:scene3d>
-    <dgm:sp3d/>
-    <dgm:txPr/>
-    <dgm:style>
-      <a:lnRef idx="2">
-        <a:scrgbClr r="0" g="0" b="0"/>
-      </a:lnRef>
-      <a:fillRef idx="1">
-        <a:scrgbClr r="0" g="0" b="0"/>
-      </a:fillRef>
-      <a:effectRef idx="0">
-        <a:scrgbClr r="0" g="0" b="0"/>
-      </a:effectRef>
-      <a:fontRef idx="minor"/>
-    </dgm:style>
-  </dgm:styleLbl>
-  <dgm:styleLbl name="fgAcc0">
-    <dgm:scene3d>
-      <a:camera prst="orthographicFront"/>
-      <a:lightRig rig="threePt" dir="t"/>
-    </dgm:scene3d>
-    <dgm:sp3d/>
-    <dgm:txPr/>
-    <dgm:style>
-      <a:lnRef idx="2">
-        <a:scrgbClr r="0" g="0" b="0"/>
-      </a:lnRef>
-      <a:fillRef idx="1">
-        <a:scrgbClr r="0" g="0" b="0"/>
-      </a:fillRef>
-      <a:effectRef idx="0">
-        <a:scrgbClr r="0" g="0" b="0"/>
-      </a:effectRef>
-      <a:fontRef idx="minor"/>
-    </dgm:style>
-  </dgm:styleLbl>
-  <dgm:styleLbl name="fgAcc2">
-    <dgm:scene3d>
-      <a:camera prst="orthographicFront"/>
-      <a:lightRig rig="threePt" dir="t"/>
-    </dgm:scene3d>
-    <dgm:sp3d/>
-    <dgm:txPr/>
-    <dgm:style>
-      <a:lnRef idx="2">
-        <a:scrgbClr r="0" g="0" b="0"/>
-      </a:lnRef>
-      <a:fillRef idx="1">
-        <a:scrgbClr r="0" g="0" b="0"/>
-      </a:fillRef>
-      <a:effectRef idx="0">
-        <a:scrgbClr r="0" g="0" b="0"/>
-      </a:effectRef>
-      <a:fontRef idx="minor"/>
-    </dgm:style>
-  </dgm:styleLbl>
-  <dgm:styleLbl name="fgAcc3">
-    <dgm:scene3d>
-      <a:camera prst="orthographicFront"/>
-      <a:lightRig rig="threePt" dir="t"/>
-    </dgm:scene3d>
-    <dgm:sp3d/>
-    <dgm:txPr/>
-    <dgm:style>
-      <a:lnRef idx="2">
-        <a:scrgbClr r="0" g="0" b="0"/>
-      </a:lnRef>
-      <a:fillRef idx="1">
-        <a:scrgbClr r="0" g="0" b="0"/>
-      </a:fillRef>
-      <a:effectRef idx="0">
-        <a:scrgbClr r="0" g="0" b="0"/>
-      </a:effectRef>
-      <a:fontRef idx="minor"/>
-    </dgm:style>
-  </dgm:styleLbl>
-  <dgm:styleLbl name="fgAcc4">
-    <dgm:scene3d>
-      <a:camera prst="orthographicFront"/>
-      <a:lightRig rig="threePt" dir="t"/>
-    </dgm:scene3d>
-    <dgm:sp3d/>
-    <dgm:txPr/>
-    <dgm:style>
-      <a:lnRef idx="2">
-        <a:scrgbClr r="0" g="0" b="0"/>
-      </a:lnRef>
-      <a:fillRef idx="1">
-        <a:scrgbClr r="0" g="0" b="0"/>
-      </a:fillRef>
-      <a:effectRef idx="0">
-        <a:scrgbClr r="0" g="0" b="0"/>
-      </a:effectRef>
-      <a:fontRef idx="minor"/>
-    </dgm:style>
-  </dgm:styleLbl>
-  <dgm:styleLbl name="bgShp">
-    <dgm:scene3d>
-      <a:camera prst="orthographicFront"/>
-      <a:lightRig rig="threePt" dir="t"/>
-    </dgm:scene3d>
-    <dgm:sp3d/>
-    <dgm:txPr/>
-    <dgm:style>
-      <a:lnRef idx="0">
-        <a:scrgbClr r="0" g="0" b="0"/>
-      </a:lnRef>
-      <a:fillRef idx="1">
-        <a:scrgbClr r="0" g="0" b="0"/>
-      </a:fillRef>
-      <a:effectRef idx="0">
-        <a:scrgbClr r="0" g="0" b="0"/>
-      </a:effectRef>
-      <a:fontRef idx="minor"/>
-    </dgm:style>
-  </dgm:styleLbl>
-  <dgm:styleLbl name="dkBgShp">
-    <dgm:scene3d>
-      <a:camera prst="orthographicFront"/>
-      <a:lightRig rig="threePt" dir="t"/>
-    </dgm:scene3d>
-    <dgm:sp3d/>
-    <dgm:txPr/>
-    <dgm:style>
-      <a:lnRef idx="0">
-        <a:scrgbClr r="0" g="0" b="0"/>
-      </a:lnRef>
-      <a:fillRef idx="1">
-        <a:scrgbClr r="0" g="0" b="0"/>
-      </a:fillRef>
-      <a:effectRef idx="0">
-        <a:scrgbClr r="0" g="0" b="0"/>
-      </a:effectRef>
-      <a:fontRef idx="minor"/>
-    </dgm:style>
-  </dgm:styleLbl>
-  <dgm:styleLbl name="trBgShp">
-    <dgm:scene3d>
-      <a:camera prst="orthographicFront"/>
-      <a:lightRig rig="threePt" dir="t"/>
-    </dgm:scene3d>
-    <dgm:sp3d/>
-    <dgm:txPr/>
-    <dgm:style>
-      <a:lnRef idx="0">
-        <a:scrgbClr r="0" g="0" b="0"/>
-      </a:lnRef>
-      <a:fillRef idx="1">
-        <a:scrgbClr r="0" g="0" b="0"/>
-      </a:fillRef>
-      <a:effectRef idx="0">
-        <a:scrgbClr r="0" g="0" b="0"/>
-      </a:effectRef>
-      <a:fontRef idx="minor"/>
-    </dgm:style>
-  </dgm:styleLbl>
-  <dgm:styleLbl name="fgShp">
-    <dgm:scene3d>
-      <a:camera prst="orthographicFront"/>
-      <a:lightRig rig="threePt" dir="t"/>
-    </dgm:scene3d>
-    <dgm:sp3d/>
-    <dgm:txPr/>
-    <dgm:style>
-      <a:lnRef idx="2">
-        <a:scrgbClr r="0" g="0" b="0"/>
-      </a:lnRef>
-      <a:fillRef idx="1">
-        <a:scrgbClr r="0" g="0" b="0"/>
-      </a:fillRef>
-      <a:effectRef idx="0">
-        <a:scrgbClr r="0" g="0" b="0"/>
-      </a:effectRef>
-      <a:fontRef idx="minor"/>
-    </dgm:style>
-  </dgm:styleLbl>
-  <dgm:styleLbl name="revTx">
-    <dgm:scene3d>
-      <a:camera prst="orthographicFront"/>
-      <a:lightRig rig="threePt" dir="t"/>
-    </dgm:scene3d>
-    <dgm:sp3d/>
-    <dgm:txPr/>
-    <dgm:style>
-      <a:lnRef idx="0">
-        <a:scrgbClr r="0" g="0" b="0"/>
-      </a:lnRef>
-      <a:fillRef idx="0">
-        <a:scrgbClr r="0" g="0" b="0"/>
-      </a:fillRef>
-      <a:effectRef idx="0">
-        <a:scrgbClr r="0" g="0" b="0"/>
-      </a:effectRef>
-      <a:fontRef idx="minor"/>
-    </dgm:style>
-  </dgm:styleLbl>
-</dgm:styleDef>
-</file>
-
 <file path=ppt/handoutMasters/handoutMaster1.xml><?xml version="1.0" encoding="utf-8"?>
 <p:handoutMaster xmlns:a="http://schemas.openxmlformats.org/drawingml/2006/main" xmlns:r="http://schemas.openxmlformats.org/officeDocument/2006/relationships" xmlns:p="http://schemas.openxmlformats.org/presentationml/2006/main">
   <p:cSld>
@@ -4196,7 +1195,7 @@
           <a:p>
             <a:fld id="{705E03B7-B591-4A2A-B695-014C5A39F13E}" type="datetimeFigureOut">
               <a:rPr lang="en-US"/>
-              <a:t>10/6/2021</a:t>
+              <a:t>10/9/2021</a:t>
             </a:fld>
             <a:endParaRPr/>
           </a:p>
@@ -4361,7 +1360,7 @@
           <a:p>
             <a:fld id="{67DFBD7B-E4FB-4AA8-9540-FD148073ACB3}" type="datetimeFigureOut">
               <a:rPr lang="en-US"/>
-              <a:t>10/6/2021</a:t>
+              <a:t>10/9/2021</a:t>
             </a:fld>
             <a:endParaRPr/>
           </a:p>
@@ -4711,6 +1710,97 @@
 </file>
 
 <file path=ppt/notesSlides/notesSlide2.xml><?xml version="1.0" encoding="utf-8"?>
+<p:notes xmlns:a="http://schemas.openxmlformats.org/drawingml/2006/main" xmlns:r="http://schemas.openxmlformats.org/officeDocument/2006/relationships" xmlns:p="http://schemas.openxmlformats.org/presentationml/2006/main">
+  <p:cSld>
+    <p:spTree>
+      <p:nvGrpSpPr>
+        <p:cNvPr id="1" name=""/>
+        <p:cNvGrpSpPr/>
+        <p:nvPr/>
+      </p:nvGrpSpPr>
+      <p:grpSpPr>
+        <a:xfrm>
+          <a:off x="0" y="0"/>
+          <a:ext cx="0" cy="0"/>
+          <a:chOff x="0" y="0"/>
+          <a:chExt cx="0" cy="0"/>
+        </a:xfrm>
+      </p:grpSpPr>
+      <p:sp>
+        <p:nvSpPr>
+          <p:cNvPr id="2" name="Slide Image Placeholder 1"/>
+          <p:cNvSpPr>
+            <a:spLocks noGrp="1" noRot="1" noChangeAspect="1"/>
+          </p:cNvSpPr>
+          <p:nvPr>
+            <p:ph type="sldImg"/>
+          </p:nvPr>
+        </p:nvSpPr>
+        <p:spPr/>
+      </p:sp>
+      <p:sp>
+        <p:nvSpPr>
+          <p:cNvPr id="3" name="Notes Placeholder 2"/>
+          <p:cNvSpPr>
+            <a:spLocks noGrp="1"/>
+          </p:cNvSpPr>
+          <p:nvPr>
+            <p:ph type="body" idx="1"/>
+          </p:nvPr>
+        </p:nvSpPr>
+        <p:spPr/>
+        <p:txBody>
+          <a:bodyPr/>
+          <a:lstStyle/>
+          <a:p>
+            <a:r>
+              <a:rPr lang="en-US" dirty="0"/>
+              <a:t>There are many ways to notice others of a recall. This is a pie chart of how the initial notice selection </a:t>
+            </a:r>
+            <a:r>
+              <a:rPr lang="en-US"/>
+              <a:t>was given. </a:t>
+            </a:r>
+          </a:p>
+        </p:txBody>
+      </p:sp>
+      <p:sp>
+        <p:nvSpPr>
+          <p:cNvPr id="4" name="Slide Number Placeholder 3"/>
+          <p:cNvSpPr>
+            <a:spLocks noGrp="1"/>
+          </p:cNvSpPr>
+          <p:nvPr>
+            <p:ph type="sldNum" sz="quarter" idx="5"/>
+          </p:nvPr>
+        </p:nvSpPr>
+        <p:spPr/>
+        <p:txBody>
+          <a:bodyPr/>
+          <a:lstStyle/>
+          <a:p>
+            <a:fld id="{B045B7DE-1198-4F2F-B574-CA8CAE341642}" type="slidenum">
+              <a:rPr lang="en-US" smtClean="0"/>
+              <a:t>5</a:t>
+            </a:fld>
+            <a:endParaRPr lang="en-US"/>
+          </a:p>
+        </p:txBody>
+      </p:sp>
+    </p:spTree>
+    <p:extLst>
+      <p:ext uri="{BB962C8B-B14F-4D97-AF65-F5344CB8AC3E}">
+        <p14:creationId xmlns:p14="http://schemas.microsoft.com/office/powerpoint/2010/main" val="3269948250"/>
+      </p:ext>
+    </p:extLst>
+  </p:cSld>
+  <p:clrMapOvr>
+    <a:masterClrMapping/>
+  </p:clrMapOvr>
+</p:notes>
+</file>
+
+<file path=ppt/notesSlides/notesSlide3.xml><?xml version="1.0" encoding="utf-8"?>
 <p:notes xmlns:a="http://schemas.openxmlformats.org/drawingml/2006/main" xmlns:r="http://schemas.openxmlformats.org/officeDocument/2006/relationships" xmlns:p="http://schemas.openxmlformats.org/presentationml/2006/main">
   <p:cSld>
     <p:spTree>
@@ -5178,7 +2268,7 @@
           <a:p>
             <a:fld id="{A7209051-6E81-43E8-9099-FF6A0C3DCFE8}" type="datetime1">
               <a:rPr lang="en-US"/>
-              <a:t>10/6/2021</a:t>
+              <a:t>10/9/2021</a:t>
             </a:fld>
             <a:endParaRPr/>
           </a:p>
@@ -5379,7 +2469,7 @@
           <a:p>
             <a:fld id="{EDCEAB04-7709-4C1E-A61A-74684A0170FC}" type="datetime1">
               <a:rPr lang="en-US"/>
-              <a:t>10/6/2021</a:t>
+              <a:t>10/9/2021</a:t>
             </a:fld>
             <a:endParaRPr/>
           </a:p>
@@ -5929,7 +3019,7 @@
           <a:p>
             <a:fld id="{0C79BD0D-E0B1-4CED-AC65-708AC79EB9CD}" type="datetime1">
               <a:rPr lang="en-US"/>
-              <a:t>10/6/2021</a:t>
+              <a:t>10/9/2021</a:t>
             </a:fld>
             <a:endParaRPr/>
           </a:p>
@@ -6130,7 +3220,7 @@
           <a:p>
             <a:fld id="{0CC3EA6D-DF0B-4D4B-B359-5F1D1D0E30A4}" type="datetime1">
               <a:rPr lang="en-US"/>
-              <a:t>10/6/2021</a:t>
+              <a:t>10/9/2021</a:t>
             </a:fld>
             <a:endParaRPr/>
           </a:p>
@@ -6734,7 +3824,7 @@
           <a:p>
             <a:fld id="{977EDB99-15BC-4479-BAC5-1E502E66917A}" type="datetime1">
               <a:rPr lang="en-US"/>
-              <a:t>10/6/2021</a:t>
+              <a:t>10/9/2021</a:t>
             </a:fld>
             <a:endParaRPr/>
           </a:p>
@@ -7046,7 +4136,7 @@
           <a:p>
             <a:fld id="{4067C2A3-CD19-48AB-9F64-ECCF75182EDD}" type="datetime1">
               <a:rPr lang="en-US"/>
-              <a:t>10/6/2021</a:t>
+              <a:t>10/9/2021</a:t>
             </a:fld>
             <a:endParaRPr/>
           </a:p>
@@ -7508,7 +4598,7 @@
           <a:p>
             <a:fld id="{0363E8C1-7C87-4705-AB97-8CD17D208E3F}" type="datetime1">
               <a:rPr lang="en-US"/>
-              <a:t>10/6/2021</a:t>
+              <a:t>10/9/2021</a:t>
             </a:fld>
             <a:endParaRPr/>
           </a:p>
@@ -7641,7 +4731,7 @@
           <a:p>
             <a:fld id="{E20C624E-DF92-4841-B9B9-DD11AA239B85}" type="datetime1">
               <a:rPr lang="en-US"/>
-              <a:t>10/6/2021</a:t>
+              <a:t>10/9/2021</a:t>
             </a:fld>
             <a:endParaRPr/>
           </a:p>
@@ -7934,7 +5024,7 @@
           <a:p>
             <a:fld id="{FBDA3AE1-4360-4D5B-BDBC-656B872DD533}" type="datetime1">
               <a:rPr lang="en-US"/>
-              <a:t>10/6/2021</a:t>
+              <a:t>10/9/2021</a:t>
             </a:fld>
             <a:endParaRPr/>
           </a:p>
@@ -8233,7 +5323,7 @@
           <a:p>
             <a:fld id="{20990708-46A4-4851-883E-8DFB8939107E}" type="datetime1">
               <a:rPr lang="en-US"/>
-              <a:t>10/6/2021</a:t>
+              <a:t>10/9/2021</a:t>
             </a:fld>
             <a:endParaRPr/>
           </a:p>
@@ -8517,7 +5607,7 @@
           <a:p>
             <a:fld id="{AE88EFFC-86AE-4294-A319-CAFC2651994B}" type="datetime1">
               <a:rPr lang="en-US"/>
-              <a:t>10/6/2021</a:t>
+              <a:t>10/9/2021</a:t>
             </a:fld>
             <a:endParaRPr/>
           </a:p>
@@ -9099,7 +6189,7 @@
             <a:fld id="{D29E8617-6EA8-4B97-A5E8-E18E98765EE2}" type="datetime1">
               <a:rPr lang="en-US"/>
               <a:pPr/>
-              <a:t>10/6/2021</a:t>
+              <a:t>10/9/2021</a:t>
             </a:fld>
             <a:endParaRPr dirty="0"/>
           </a:p>
@@ -10465,77 +7555,61 @@
             <p:ph type="title"/>
           </p:nvPr>
         </p:nvSpPr>
-        <p:spPr/>
-        <p:txBody>
-          <a:bodyPr/>
+        <p:spPr>
+          <a:xfrm>
+            <a:off x="1218883" y="152400"/>
+            <a:ext cx="9751060" cy="1295400"/>
+          </a:xfrm>
+        </p:spPr>
+        <p:txBody>
+          <a:bodyPr anchor="b">
+            <a:normAutofit/>
+          </a:bodyPr>
           <a:lstStyle/>
           <a:p>
             <a:r>
               <a:rPr lang="en-US" dirty="0"/>
-              <a:t>Two Content Layout with SmartArt</a:t>
-            </a:r>
-          </a:p>
-        </p:txBody>
-      </p:sp>
-      <p:sp>
-        <p:nvSpPr>
-          <p:cNvPr id="3" name="Content Placeholder 2"/>
-          <p:cNvSpPr>
-            <a:spLocks noGrp="1"/>
-          </p:cNvSpPr>
-          <p:nvPr>
-            <p:ph sz="half" idx="1"/>
-          </p:nvPr>
-        </p:nvSpPr>
-        <p:spPr/>
-        <p:txBody>
-          <a:bodyPr/>
-          <a:lstStyle/>
-          <a:p>
-            <a:r>
-              <a:rPr lang="en-US" dirty="0"/>
-              <a:t>First bullet point here</a:t>
-            </a:r>
-          </a:p>
-          <a:p>
-            <a:r>
-              <a:rPr lang="en-US" dirty="0"/>
-              <a:t>Second bullet point here</a:t>
-            </a:r>
-          </a:p>
-          <a:p>
-            <a:r>
-              <a:rPr lang="en-US" dirty="0"/>
-              <a:t>Third bullet point here</a:t>
-            </a:r>
-          </a:p>
-        </p:txBody>
-      </p:sp>
-      <p:graphicFrame>
-        <p:nvGraphicFramePr>
-          <p:cNvPr id="5" name="Content Placeholder 4" descr="Radial cycle shows the relationship between 3 tasks to a group"/>
-          <p:cNvGraphicFramePr>
-            <a:graphicFrameLocks noGrp="1"/>
-          </p:cNvGraphicFramePr>
-          <p:nvPr>
-            <p:ph sz="half" idx="2"/>
-            <p:extLst>
-              <p:ext uri="{D42A27DB-BD31-4B8C-83A1-F6EECF244321}">
-                <p14:modId xmlns:p14="http://schemas.microsoft.com/office/powerpoint/2010/main" val="4164069720"/>
-              </p:ext>
-            </p:extLst>
-          </p:nvPr>
-        </p:nvGraphicFramePr>
-        <p:xfrm>
-          <a:off x="6094413" y="1600200"/>
-          <a:ext cx="4875212" cy="4572000"/>
-        </p:xfrm>
-        <a:graphic>
-          <a:graphicData uri="http://schemas.openxmlformats.org/drawingml/2006/diagram">
-            <dgm:relIds xmlns:dgm="http://schemas.openxmlformats.org/drawingml/2006/diagram" xmlns:r="http://schemas.openxmlformats.org/officeDocument/2006/relationships" r:dm="rId2" r:lo="rId3" r:qs="rId4" r:cs="rId5"/>
-          </a:graphicData>
-        </a:graphic>
-      </p:graphicFrame>
+              <a:t>FDA Notices </a:t>
+            </a:r>
+          </a:p>
+        </p:txBody>
+      </p:sp>
+      <p:pic>
+        <p:nvPicPr>
+          <p:cNvPr id="8" name="Content Placeholder 7" descr="Chart, pie chart&#10;&#10;Description automatically generated">
+            <a:extLst>
+              <a:ext uri="{FF2B5EF4-FFF2-40B4-BE49-F238E27FC236}">
+                <a16:creationId xmlns:a16="http://schemas.microsoft.com/office/drawing/2014/main" id="{D80940D2-D169-48EA-9812-933FBE553DC8}"/>
+              </a:ext>
+            </a:extLst>
+          </p:cNvPr>
+          <p:cNvPicPr>
+            <a:picLocks noGrp="1" noChangeAspect="1"/>
+          </p:cNvPicPr>
+          <p:nvPr>
+            <p:ph idx="1"/>
+          </p:nvPr>
+        </p:nvPicPr>
+        <p:blipFill>
+          <a:blip r:embed="rId3">
+            <a:extLst>
+              <a:ext uri="{28A0092B-C50C-407E-A947-70E740481C1C}">
+                <a14:useLocalDpi xmlns:a14="http://schemas.microsoft.com/office/drawing/2010/main" val="0"/>
+              </a:ext>
+            </a:extLst>
+          </a:blip>
+          <a:stretch>
+            <a:fillRect/>
+          </a:stretch>
+        </p:blipFill>
+        <p:spPr>
+          <a:xfrm>
+            <a:off x="2665413" y="1600200"/>
+            <a:ext cx="6857999" cy="4572000"/>
+          </a:xfrm>
+          <a:noFill/>
+        </p:spPr>
+      </p:pic>
     </p:spTree>
     <p:extLst>
       <p:ext uri="{BB962C8B-B14F-4D97-AF65-F5344CB8AC3E}">
@@ -11586,15 +8660,6 @@
 </file>
 
 <file path=customXml/item1.xml><?xml version="1.0" encoding="utf-8"?>
-<?mso-contentType ?>
-<FormTemplates xmlns="http://schemas.microsoft.com/sharepoint/v3/contenttype/forms">
-  <Display>DocumentLibraryForm</Display>
-  <Edit>DocumentLibraryForm</Edit>
-  <New>DocumentLibraryForm</New>
-</FormTemplates>
-</file>
-
-<file path=customXml/item2.xml><?xml version="1.0" encoding="utf-8"?>
 <p:properties xmlns:p="http://schemas.microsoft.com/office/2006/metadata/properties" xmlns:xsi="http://www.w3.org/2001/XMLSchema-instance" xmlns:pc="http://schemas.microsoft.com/office/infopath/2007/PartnerControls">
   <documentManagement>
     <VSO_x0020_item_x0020_id xmlns="40262f94-9f35-4ac3-9a90-690165a166b7" xsi:nil="true"/>
@@ -11603,6 +8668,15 @@
     <Template_x0020_details xmlns="40262f94-9f35-4ac3-9a90-690165a166b7" xsi:nil="true"/>
   </documentManagement>
 </p:properties>
+</file>
+
+<file path=customXml/item2.xml><?xml version="1.0" encoding="utf-8"?>
+<?mso-contentType ?>
+<FormTemplates xmlns="http://schemas.microsoft.com/sharepoint/v3/contenttype/forms">
+  <Display>DocumentLibraryForm</Display>
+  <Edit>DocumentLibraryForm</Edit>
+  <New>DocumentLibraryForm</New>
+</FormTemplates>
 </file>
 
 <file path=customXml/item3.xml><?xml version="1.0" encoding="utf-8"?>
@@ -11787,14 +8861,6 @@
 </file>
 
 <file path=customXml/itemProps1.xml><?xml version="1.0" encoding="utf-8"?>
-<ds:datastoreItem xmlns:ds="http://schemas.openxmlformats.org/officeDocument/2006/customXml" ds:itemID="{308942AA-0721-4324-BC2C-A3CB43F24E71}">
-  <ds:schemaRefs>
-    <ds:schemaRef ds:uri="http://schemas.microsoft.com/sharepoint/v3/contenttype/forms"/>
-  </ds:schemaRefs>
-</ds:datastoreItem>
-</file>
-
-<file path=customXml/itemProps2.xml><?xml version="1.0" encoding="utf-8"?>
 <ds:datastoreItem xmlns:ds="http://schemas.openxmlformats.org/officeDocument/2006/customXml" ds:itemID="{5E700CCB-20BA-4760-AB9F-AC3B63ED32E0}">
   <ds:schemaRefs>
     <ds:schemaRef ds:uri="http://schemas.microsoft.com/office/infopath/2007/PartnerControls"/>
@@ -11807,6 +8873,14 @@
     <ds:schemaRef ds:uri="40262f94-9f35-4ac3-9a90-690165a166b7"/>
     <ds:schemaRef ds:uri="a4f35948-e619-41b3-aa29-22878b09cfd2"/>
     <ds:schemaRef ds:uri="http://www.w3.org/XML/1998/namespace"/>
+  </ds:schemaRefs>
+</ds:datastoreItem>
+</file>
+
+<file path=customXml/itemProps2.xml><?xml version="1.0" encoding="utf-8"?>
+<ds:datastoreItem xmlns:ds="http://schemas.openxmlformats.org/officeDocument/2006/customXml" ds:itemID="{308942AA-0721-4324-BC2C-A3CB43F24E71}">
+  <ds:schemaRefs>
+    <ds:schemaRef ds:uri="http://schemas.microsoft.com/sharepoint/v3/contenttype/forms"/>
   </ds:schemaRefs>
 </ds:datastoreItem>
 </file>

</xml_diff>